<commit_message>
forecast :: extract data documentation
> Comments
> PPT
</commit_message>
<xml_diff>
--- a/R/Sales Forecasting/Documentation/Steps.pptx
+++ b/R/Sales Forecasting/Documentation/Steps.pptx
@@ -6,6 +6,7 @@
   </p:sldMasterIdLst>
   <p:sldIdLst>
     <p:sldId id="256" r:id="rId2"/>
+    <p:sldId id="257" r:id="rId3"/>
   </p:sldIdLst>
   <p:sldSz cx="12192000" cy="6858000"/>
   <p:notesSz cx="6858000" cy="9144000"/>
@@ -104,6 +105,11 @@
       </a:defRPr>
     </a:lvl9pPr>
   </p:defaultTextStyle>
+  <p:extLst>
+    <p:ext uri="{EFAFB233-063F-42B5-8137-9DF3F51BA10A}">
+      <p15:sldGuideLst xmlns:p15="http://schemas.microsoft.com/office/powerpoint/2012/main"/>
+    </p:ext>
+  </p:extLst>
 </p:presentation>
 </file>
 
@@ -3298,6 +3304,261 @@
 </p:sld>
 </file>
 
+<file path=ppt/slides/slide2.xml><?xml version="1.0" encoding="utf-8"?>
+<p:sld xmlns:a="http://schemas.openxmlformats.org/drawingml/2006/main" xmlns:r="http://schemas.openxmlformats.org/officeDocument/2006/relationships" xmlns:p="http://schemas.openxmlformats.org/presentationml/2006/main">
+  <p:cSld>
+    <p:spTree>
+      <p:nvGrpSpPr>
+        <p:cNvPr id="1" name=""/>
+        <p:cNvGrpSpPr/>
+        <p:nvPr/>
+      </p:nvGrpSpPr>
+      <p:grpSpPr>
+        <a:xfrm>
+          <a:off x="0" y="0"/>
+          <a:ext cx="0" cy="0"/>
+          <a:chOff x="0" y="0"/>
+          <a:chExt cx="0" cy="0"/>
+        </a:xfrm>
+      </p:grpSpPr>
+      <p:pic>
+        <p:nvPicPr>
+          <p:cNvPr id="4" name="Picture 3"/>
+          <p:cNvPicPr>
+            <a:picLocks noChangeAspect="1"/>
+          </p:cNvPicPr>
+          <p:nvPr/>
+        </p:nvPicPr>
+        <p:blipFill>
+          <a:blip r:embed="rId2">
+            <a:extLst>
+              <a:ext uri="{28A0092B-C50C-407E-A947-70E740481C1C}">
+                <a14:useLocalDpi xmlns:a14="http://schemas.microsoft.com/office/drawing/2010/main" val="0"/>
+              </a:ext>
+            </a:extLst>
+          </a:blip>
+          <a:stretch>
+            <a:fillRect/>
+          </a:stretch>
+        </p:blipFill>
+        <p:spPr>
+          <a:xfrm>
+            <a:off x="1385382" y="0"/>
+            <a:ext cx="8726292" cy="6858000"/>
+          </a:xfrm>
+          <a:prstGeom prst="rect">
+            <a:avLst/>
+          </a:prstGeom>
+        </p:spPr>
+      </p:pic>
+      <p:sp>
+        <p:nvSpPr>
+          <p:cNvPr id="5" name="TextBox 4"/>
+          <p:cNvSpPr txBox="1"/>
+          <p:nvPr/>
+        </p:nvSpPr>
+        <p:spPr>
+          <a:xfrm>
+            <a:off x="0" y="4462272"/>
+            <a:ext cx="3794181" cy="1200329"/>
+          </a:xfrm>
+          <a:prstGeom prst="rect">
+            <a:avLst/>
+          </a:prstGeom>
+          <a:noFill/>
+        </p:spPr>
+        <p:txBody>
+          <a:bodyPr wrap="none" rtlCol="0">
+            <a:spAutoFit/>
+          </a:bodyPr>
+          <a:lstStyle/>
+          <a:p>
+            <a:r>
+              <a:rPr lang="en-US" b="1" dirty="0" smtClean="0">
+                <a:solidFill>
+                  <a:srgbClr val="FF0000"/>
+                </a:solidFill>
+              </a:rPr>
+              <a:t>NOTE:</a:t>
+            </a:r>
+            <a:r>
+              <a:rPr lang="en-US" dirty="0" smtClean="0"/>
+              <a:t> The steps in this tab can be </a:t>
+            </a:r>
+          </a:p>
+          <a:p>
+            <a:r>
+              <a:rPr lang="en-US" dirty="0" smtClean="0"/>
+              <a:t>skipped if the external data has been </a:t>
+            </a:r>
+          </a:p>
+          <a:p>
+            <a:r>
+              <a:rPr lang="en-US" dirty="0" smtClean="0"/>
+              <a:t>fetched and stored in the local system.</a:t>
+            </a:r>
+          </a:p>
+          <a:p>
+            <a:endParaRPr lang="en-US" dirty="0"/>
+          </a:p>
+        </p:txBody>
+      </p:sp>
+      <p:sp>
+        <p:nvSpPr>
+          <p:cNvPr id="6" name="TextBox 5"/>
+          <p:cNvSpPr txBox="1"/>
+          <p:nvPr/>
+        </p:nvSpPr>
+        <p:spPr>
+          <a:xfrm>
+            <a:off x="10205788" y="2888226"/>
+            <a:ext cx="2051331" cy="923330"/>
+          </a:xfrm>
+          <a:prstGeom prst="rect">
+            <a:avLst/>
+          </a:prstGeom>
+          <a:noFill/>
+        </p:spPr>
+        <p:txBody>
+          <a:bodyPr wrap="none" rtlCol="0">
+            <a:spAutoFit/>
+          </a:bodyPr>
+          <a:lstStyle/>
+          <a:p>
+            <a:r>
+              <a:rPr lang="en-US" dirty="0" smtClean="0"/>
+              <a:t>Step 1: Select the </a:t>
+            </a:r>
+          </a:p>
+          <a:p>
+            <a:r>
+              <a:rPr lang="en-US" dirty="0" smtClean="0"/>
+              <a:t>subcategories that </a:t>
+            </a:r>
+          </a:p>
+          <a:p>
+            <a:r>
+              <a:rPr lang="en-US" dirty="0" smtClean="0"/>
+              <a:t>needs to be fetched</a:t>
+            </a:r>
+            <a:endParaRPr lang="en-US" dirty="0"/>
+          </a:p>
+        </p:txBody>
+      </p:sp>
+      <p:sp>
+        <p:nvSpPr>
+          <p:cNvPr id="7" name="TextBox 6"/>
+          <p:cNvSpPr txBox="1"/>
+          <p:nvPr/>
+        </p:nvSpPr>
+        <p:spPr>
+          <a:xfrm>
+            <a:off x="4357396" y="6419461"/>
+            <a:ext cx="7588680" cy="369332"/>
+          </a:xfrm>
+          <a:prstGeom prst="rect">
+            <a:avLst/>
+          </a:prstGeom>
+          <a:noFill/>
+        </p:spPr>
+        <p:txBody>
+          <a:bodyPr wrap="none" rtlCol="0">
+            <a:spAutoFit/>
+          </a:bodyPr>
+          <a:lstStyle/>
+          <a:p>
+            <a:r>
+              <a:rPr lang="en-US" dirty="0" smtClean="0"/>
+              <a:t>Step 2: Click to Fetch the selected sub-categories. It takes a while to fetch them.</a:t>
+            </a:r>
+            <a:endParaRPr lang="en-US" dirty="0"/>
+          </a:p>
+        </p:txBody>
+      </p:sp>
+      <p:sp>
+        <p:nvSpPr>
+          <p:cNvPr id="10" name="Right Brace 9"/>
+          <p:cNvSpPr/>
+          <p:nvPr/>
+        </p:nvSpPr>
+        <p:spPr>
+          <a:xfrm>
+            <a:off x="10111674" y="541176"/>
+            <a:ext cx="45719" cy="5756987"/>
+          </a:xfrm>
+          <a:prstGeom prst="rightBrace">
+            <a:avLst/>
+          </a:prstGeom>
+        </p:spPr>
+        <p:style>
+          <a:lnRef idx="3">
+            <a:schemeClr val="dk1"/>
+          </a:lnRef>
+          <a:fillRef idx="0">
+            <a:schemeClr val="dk1"/>
+          </a:fillRef>
+          <a:effectRef idx="2">
+            <a:schemeClr val="dk1"/>
+          </a:effectRef>
+          <a:fontRef idx="minor">
+            <a:schemeClr val="tx1"/>
+          </a:fontRef>
+        </p:style>
+        <p:txBody>
+          <a:bodyPr rtlCol="0" anchor="ctr"/>
+          <a:lstStyle/>
+          <a:p>
+            <a:pPr algn="ctr"/>
+            <a:endParaRPr lang="en-US"/>
+          </a:p>
+        </p:txBody>
+      </p:sp>
+      <p:cxnSp>
+        <p:nvCxnSpPr>
+          <p:cNvPr id="12" name="Straight Arrow Connector 11"/>
+          <p:cNvCxnSpPr/>
+          <p:nvPr/>
+        </p:nvCxnSpPr>
+        <p:spPr>
+          <a:xfrm flipH="1">
+            <a:off x="4152122" y="6604127"/>
+            <a:ext cx="205274" cy="0"/>
+          </a:xfrm>
+          <a:prstGeom prst="straightConnector1">
+            <a:avLst/>
+          </a:prstGeom>
+          <a:ln>
+            <a:tailEnd type="triangle"/>
+          </a:ln>
+        </p:spPr>
+        <p:style>
+          <a:lnRef idx="3">
+            <a:schemeClr val="dk1"/>
+          </a:lnRef>
+          <a:fillRef idx="0">
+            <a:schemeClr val="dk1"/>
+          </a:fillRef>
+          <a:effectRef idx="2">
+            <a:schemeClr val="dk1"/>
+          </a:effectRef>
+          <a:fontRef idx="minor">
+            <a:schemeClr val="tx1"/>
+          </a:fontRef>
+        </p:style>
+      </p:cxnSp>
+    </p:spTree>
+    <p:extLst>
+      <p:ext uri="{BB962C8B-B14F-4D97-AF65-F5344CB8AC3E}">
+        <p14:creationId xmlns:p14="http://schemas.microsoft.com/office/powerpoint/2010/main" val="2052474774"/>
+      </p:ext>
+    </p:extLst>
+  </p:cSld>
+  <p:clrMapOvr>
+    <a:masterClrMapping/>
+  </p:clrMapOvr>
+</p:sld>
+</file>
+
 <file path=ppt/theme/theme1.xml><?xml version="1.0" encoding="utf-8"?>
 <a:theme xmlns:a="http://schemas.openxmlformats.org/drawingml/2006/main" name="Office Theme">
   <a:themeElements>

</xml_diff>

<commit_message>
forecast :: screenshots slides
</commit_message>
<xml_diff>
--- a/R/Sales Forecasting/Documentation/Steps.pptx
+++ b/R/Sales Forecasting/Documentation/Steps.pptx
@@ -5,8 +5,23 @@
     <p:sldMasterId id="2147483648" r:id="rId1"/>
   </p:sldMasterIdLst>
   <p:sldIdLst>
-    <p:sldId id="256" r:id="rId2"/>
-    <p:sldId id="257" r:id="rId3"/>
+    <p:sldId id="262" r:id="rId2"/>
+    <p:sldId id="256" r:id="rId3"/>
+    <p:sldId id="263" r:id="rId4"/>
+    <p:sldId id="257" r:id="rId5"/>
+    <p:sldId id="264" r:id="rId6"/>
+    <p:sldId id="258" r:id="rId7"/>
+    <p:sldId id="259" r:id="rId8"/>
+    <p:sldId id="260" r:id="rId9"/>
+    <p:sldId id="265" r:id="rId10"/>
+    <p:sldId id="261" r:id="rId11"/>
+    <p:sldId id="266" r:id="rId12"/>
+    <p:sldId id="267" r:id="rId13"/>
+    <p:sldId id="268" r:id="rId14"/>
+    <p:sldId id="269" r:id="rId15"/>
+    <p:sldId id="270" r:id="rId16"/>
+    <p:sldId id="271" r:id="rId17"/>
+    <p:sldId id="272" r:id="rId18"/>
   </p:sldIdLst>
   <p:sldSz cx="12192000" cy="6858000"/>
   <p:notesSz cx="6858000" cy="9144000"/>
@@ -244,7 +259,7 @@
           <a:p>
             <a:fld id="{48465B23-94FF-40FF-8903-9A2CA119CAD8}" type="datetimeFigureOut">
               <a:rPr lang="en-US" smtClean="0"/>
-              <a:t>9/15/2017</a:t>
+              <a:t>9/21/2017</a:t>
             </a:fld>
             <a:endParaRPr lang="en-US"/>
           </a:p>
@@ -414,7 +429,7 @@
           <a:p>
             <a:fld id="{48465B23-94FF-40FF-8903-9A2CA119CAD8}" type="datetimeFigureOut">
               <a:rPr lang="en-US" smtClean="0"/>
-              <a:t>9/15/2017</a:t>
+              <a:t>9/21/2017</a:t>
             </a:fld>
             <a:endParaRPr lang="en-US"/>
           </a:p>
@@ -594,7 +609,7 @@
           <a:p>
             <a:fld id="{48465B23-94FF-40FF-8903-9A2CA119CAD8}" type="datetimeFigureOut">
               <a:rPr lang="en-US" smtClean="0"/>
-              <a:t>9/15/2017</a:t>
+              <a:t>9/21/2017</a:t>
             </a:fld>
             <a:endParaRPr lang="en-US"/>
           </a:p>
@@ -764,7 +779,7 @@
           <a:p>
             <a:fld id="{48465B23-94FF-40FF-8903-9A2CA119CAD8}" type="datetimeFigureOut">
               <a:rPr lang="en-US" smtClean="0"/>
-              <a:t>9/15/2017</a:t>
+              <a:t>9/21/2017</a:t>
             </a:fld>
             <a:endParaRPr lang="en-US"/>
           </a:p>
@@ -1010,7 +1025,7 @@
           <a:p>
             <a:fld id="{48465B23-94FF-40FF-8903-9A2CA119CAD8}" type="datetimeFigureOut">
               <a:rPr lang="en-US" smtClean="0"/>
-              <a:t>9/15/2017</a:t>
+              <a:t>9/21/2017</a:t>
             </a:fld>
             <a:endParaRPr lang="en-US"/>
           </a:p>
@@ -1242,7 +1257,7 @@
           <a:p>
             <a:fld id="{48465B23-94FF-40FF-8903-9A2CA119CAD8}" type="datetimeFigureOut">
               <a:rPr lang="en-US" smtClean="0"/>
-              <a:t>9/15/2017</a:t>
+              <a:t>9/21/2017</a:t>
             </a:fld>
             <a:endParaRPr lang="en-US"/>
           </a:p>
@@ -1609,7 +1624,7 @@
           <a:p>
             <a:fld id="{48465B23-94FF-40FF-8903-9A2CA119CAD8}" type="datetimeFigureOut">
               <a:rPr lang="en-US" smtClean="0"/>
-              <a:t>9/15/2017</a:t>
+              <a:t>9/21/2017</a:t>
             </a:fld>
             <a:endParaRPr lang="en-US"/>
           </a:p>
@@ -1727,7 +1742,7 @@
           <a:p>
             <a:fld id="{48465B23-94FF-40FF-8903-9A2CA119CAD8}" type="datetimeFigureOut">
               <a:rPr lang="en-US" smtClean="0"/>
-              <a:t>9/15/2017</a:t>
+              <a:t>9/21/2017</a:t>
             </a:fld>
             <a:endParaRPr lang="en-US"/>
           </a:p>
@@ -1822,7 +1837,7 @@
           <a:p>
             <a:fld id="{48465B23-94FF-40FF-8903-9A2CA119CAD8}" type="datetimeFigureOut">
               <a:rPr lang="en-US" smtClean="0"/>
-              <a:t>9/15/2017</a:t>
+              <a:t>9/21/2017</a:t>
             </a:fld>
             <a:endParaRPr lang="en-US"/>
           </a:p>
@@ -2099,7 +2114,7 @@
           <a:p>
             <a:fld id="{48465B23-94FF-40FF-8903-9A2CA119CAD8}" type="datetimeFigureOut">
               <a:rPr lang="en-US" smtClean="0"/>
-              <a:t>9/15/2017</a:t>
+              <a:t>9/21/2017</a:t>
             </a:fld>
             <a:endParaRPr lang="en-US"/>
           </a:p>
@@ -2352,7 +2367,7 @@
           <a:p>
             <a:fld id="{48465B23-94FF-40FF-8903-9A2CA119CAD8}" type="datetimeFigureOut">
               <a:rPr lang="en-US" smtClean="0"/>
-              <a:t>9/15/2017</a:t>
+              <a:t>9/21/2017</a:t>
             </a:fld>
             <a:endParaRPr lang="en-US"/>
           </a:p>
@@ -2565,7 +2580,7 @@
           <a:p>
             <a:fld id="{48465B23-94FF-40FF-8903-9A2CA119CAD8}" type="datetimeFigureOut">
               <a:rPr lang="en-US" smtClean="0"/>
-              <a:t>9/15/2017</a:t>
+              <a:t>9/21/2017</a:t>
             </a:fld>
             <a:endParaRPr lang="en-US"/>
           </a:p>
@@ -2970,6 +2985,72 @@
           <a:chExt cx="0" cy="0"/>
         </a:xfrm>
       </p:grpSpPr>
+      <p:sp>
+        <p:nvSpPr>
+          <p:cNvPr id="2" name="Title 1"/>
+          <p:cNvSpPr>
+            <a:spLocks noGrp="1"/>
+          </p:cNvSpPr>
+          <p:nvPr>
+            <p:ph type="title"/>
+          </p:nvPr>
+        </p:nvSpPr>
+        <p:spPr>
+          <a:xfrm>
+            <a:off x="801624" y="2349373"/>
+            <a:ext cx="10515600" cy="1325563"/>
+          </a:xfrm>
+        </p:spPr>
+        <p:txBody>
+          <a:bodyPr/>
+          <a:lstStyle/>
+          <a:p>
+            <a:pPr algn="ctr"/>
+            <a:r>
+              <a:rPr lang="en-US" dirty="0" smtClean="0"/>
+              <a:t>Step I : Product Selection</a:t>
+            </a:r>
+            <a:endParaRPr lang="en-US" dirty="0"/>
+          </a:p>
+        </p:txBody>
+      </p:sp>
+    </p:spTree>
+    <p:extLst>
+      <p:ext uri="{BB962C8B-B14F-4D97-AF65-F5344CB8AC3E}">
+        <p14:creationId xmlns:p14="http://schemas.microsoft.com/office/powerpoint/2010/main" val="6750482"/>
+      </p:ext>
+    </p:extLst>
+  </p:cSld>
+  <p:clrMapOvr>
+    <a:masterClrMapping/>
+  </p:clrMapOvr>
+  <p:timing>
+    <p:tnLst>
+      <p:par>
+        <p:cTn id="1" dur="indefinite" restart="never" nodeType="tmRoot"/>
+      </p:par>
+    </p:tnLst>
+  </p:timing>
+</p:sld>
+</file>
+
+<file path=ppt/slides/slide10.xml><?xml version="1.0" encoding="utf-8"?>
+<p:sld xmlns:a="http://schemas.openxmlformats.org/drawingml/2006/main" xmlns:r="http://schemas.openxmlformats.org/officeDocument/2006/relationships" xmlns:p="http://schemas.openxmlformats.org/presentationml/2006/main">
+  <p:cSld>
+    <p:spTree>
+      <p:nvGrpSpPr>
+        <p:cNvPr id="1" name=""/>
+        <p:cNvGrpSpPr/>
+        <p:nvPr/>
+      </p:nvGrpSpPr>
+      <p:grpSpPr>
+        <a:xfrm>
+          <a:off x="0" y="0"/>
+          <a:ext cx="0" cy="0"/>
+          <a:chOff x="0" y="0"/>
+          <a:chExt cx="0" cy="0"/>
+        </a:xfrm>
+      </p:grpSpPr>
       <p:pic>
         <p:nvPicPr>
           <p:cNvPr id="4" name="Picture 3"/>
@@ -2979,21 +3060,15 @@
           <p:nvPr/>
         </p:nvPicPr>
         <p:blipFill>
-          <a:blip r:embed="rId2">
-            <a:extLst>
-              <a:ext uri="{28A0092B-C50C-407E-A947-70E740481C1C}">
-                <a14:useLocalDpi xmlns:a14="http://schemas.microsoft.com/office/drawing/2010/main" val="0"/>
-              </a:ext>
-            </a:extLst>
-          </a:blip>
+          <a:blip r:embed="rId2"/>
           <a:stretch>
             <a:fillRect/>
           </a:stretch>
         </p:blipFill>
         <p:spPr>
           <a:xfrm>
-            <a:off x="173433" y="59316"/>
-            <a:ext cx="11668048" cy="6734676"/>
+            <a:off x="345776" y="419877"/>
+            <a:ext cx="10960500" cy="6180337"/>
           </a:xfrm>
           <a:prstGeom prst="rect">
             <a:avLst/>
@@ -3008,8 +3083,8 @@
         </p:nvSpPr>
         <p:spPr>
           <a:xfrm>
-            <a:off x="173433" y="1929384"/>
-            <a:ext cx="2292807" cy="646331"/>
+            <a:off x="6741597" y="1156823"/>
+            <a:ext cx="5450403" cy="923330"/>
           </a:xfrm>
           <a:prstGeom prst="rect">
             <a:avLst/>
@@ -3024,17 +3099,19 @@
           <a:p>
             <a:r>
               <a:rPr lang="en-US" dirty="0" smtClean="0"/>
-              <a:t>Step 1: Select Product </a:t>
-            </a:r>
-          </a:p>
-          <a:p>
-            <a:r>
-              <a:rPr lang="en-US" dirty="0"/>
-              <a:t> </a:t>
-            </a:r>
-            <a:r>
-              <a:rPr lang="en-US" dirty="0" smtClean="0"/>
-              <a:t>             Line</a:t>
+              <a:t>Step 1: Select the set of feature [Best/Simple] of LASSO, </a:t>
+            </a:r>
+          </a:p>
+          <a:p>
+            <a:r>
+              <a:rPr lang="en-US" dirty="0" smtClean="0"/>
+              <a:t>which has to used for building regression model . </a:t>
+            </a:r>
+          </a:p>
+          <a:p>
+            <a:r>
+              <a:rPr lang="en-US" dirty="0" smtClean="0"/>
+              <a:t>Click “Fetch Features” to populate them below. </a:t>
             </a:r>
             <a:endParaRPr lang="en-US" dirty="0"/>
           </a:p>
@@ -3047,28 +3124,25 @@
           <p:nvPr/>
         </p:nvCxnSpPr>
         <p:spPr>
-          <a:xfrm flipV="1">
-            <a:off x="1609344" y="1252728"/>
-            <a:ext cx="0" cy="594360"/>
+          <a:xfrm flipH="1">
+            <a:off x="4928525" y="1618488"/>
+            <a:ext cx="1792407" cy="0"/>
           </a:xfrm>
           <a:prstGeom prst="straightConnector1">
             <a:avLst/>
           </a:prstGeom>
           <a:ln>
-            <a:solidFill>
-              <a:schemeClr val="tx1"/>
-            </a:solidFill>
             <a:tailEnd type="triangle"/>
           </a:ln>
         </p:spPr>
         <p:style>
-          <a:lnRef idx="1">
+          <a:lnRef idx="3">
             <a:schemeClr val="dk1"/>
           </a:lnRef>
           <a:fillRef idx="0">
             <a:schemeClr val="dk1"/>
           </a:fillRef>
-          <a:effectRef idx="0">
+          <a:effectRef idx="2">
             <a:schemeClr val="dk1"/>
           </a:effectRef>
           <a:fontRef idx="minor">
@@ -3076,46 +3150,16 @@
           </a:fontRef>
         </p:style>
       </p:cxnSp>
-      <p:sp>
-        <p:nvSpPr>
-          <p:cNvPr id="10" name="TextBox 9"/>
-          <p:cNvSpPr txBox="1"/>
-          <p:nvPr/>
-        </p:nvSpPr>
-        <p:spPr>
-          <a:xfrm>
-            <a:off x="8311896" y="800100"/>
-            <a:ext cx="3110852" cy="369332"/>
-          </a:xfrm>
-          <a:prstGeom prst="rect">
-            <a:avLst/>
-          </a:prstGeom>
-          <a:noFill/>
-        </p:spPr>
-        <p:txBody>
-          <a:bodyPr wrap="none" rtlCol="0">
-            <a:spAutoFit/>
-          </a:bodyPr>
-          <a:lstStyle/>
-          <a:p>
-            <a:r>
-              <a:rPr lang="en-US" dirty="0" smtClean="0"/>
-              <a:t>Step 2: Select the revenue type</a:t>
-            </a:r>
-            <a:endParaRPr lang="en-US" dirty="0"/>
-          </a:p>
-        </p:txBody>
-      </p:sp>
       <p:cxnSp>
         <p:nvCxnSpPr>
-          <p:cNvPr id="12" name="Straight Arrow Connector 11"/>
+          <p:cNvPr id="11" name="Straight Arrow Connector 10"/>
           <p:cNvCxnSpPr/>
           <p:nvPr/>
         </p:nvCxnSpPr>
         <p:spPr>
           <a:xfrm flipH="1">
-            <a:off x="7690104" y="984766"/>
-            <a:ext cx="557784" cy="0"/>
+            <a:off x="6245352" y="1344168"/>
+            <a:ext cx="475580" cy="0"/>
           </a:xfrm>
           <a:prstGeom prst="straightConnector1">
             <a:avLst/>
@@ -3125,13 +3169,13 @@
           </a:ln>
         </p:spPr>
         <p:style>
-          <a:lnRef idx="1">
+          <a:lnRef idx="3">
             <a:schemeClr val="dk1"/>
           </a:lnRef>
           <a:fillRef idx="0">
             <a:schemeClr val="dk1"/>
           </a:fillRef>
-          <a:effectRef idx="0">
+          <a:effectRef idx="2">
             <a:schemeClr val="dk1"/>
           </a:effectRef>
           <a:fontRef idx="minor">
@@ -3141,14 +3185,14 @@
       </p:cxnSp>
       <p:sp>
         <p:nvSpPr>
-          <p:cNvPr id="13" name="TextBox 12"/>
+          <p:cNvPr id="12" name="TextBox 11"/>
           <p:cNvSpPr txBox="1"/>
           <p:nvPr/>
         </p:nvSpPr>
         <p:spPr>
           <a:xfrm>
-            <a:off x="5257800" y="1379958"/>
-            <a:ext cx="6435031" cy="1200329"/>
+            <a:off x="4928525" y="4553712"/>
+            <a:ext cx="6138027" cy="923330"/>
           </a:xfrm>
           <a:prstGeom prst="rect">
             <a:avLst/>
@@ -3163,33 +3207,27 @@
           <a:p>
             <a:r>
               <a:rPr lang="en-US" dirty="0" smtClean="0"/>
-              <a:t>Step 3 [Optional] : Select observations to be excluded by </a:t>
+              <a:t>Step 2: Click “Build Regression” to build linear regression model</a:t>
             </a:r>
           </a:p>
           <a:p>
             <a:r>
               <a:rPr lang="en-US" dirty="0"/>
-              <a:t>	 </a:t>
-            </a:r>
-            <a:r>
-              <a:rPr lang="en-US" dirty="0" smtClean="0"/>
-              <a:t> 	clicking on the data points. Such points</a:t>
-            </a:r>
-          </a:p>
-          <a:p>
-            <a:r>
-              <a:rPr lang="en-US" dirty="0" smtClean="0"/>
-              <a:t>                                   would be listed in the “exclude observations#” </a:t>
+              <a:t>u</a:t>
+            </a:r>
+            <a:r>
+              <a:rPr lang="en-US" dirty="0" smtClean="0"/>
+              <a:t>sing the selected features. If any of the tests fails, analyze</a:t>
             </a:r>
           </a:p>
           <a:p>
             <a:r>
               <a:rPr lang="en-US" dirty="0"/>
-              <a:t>	</a:t>
-            </a:r>
-            <a:r>
-              <a:rPr lang="en-US" dirty="0" smtClean="0"/>
-              <a:t>	box. </a:t>
+              <a:t>t</a:t>
+            </a:r>
+            <a:r>
+              <a:rPr lang="en-US" dirty="0" smtClean="0"/>
+              <a:t>he plots below.</a:t>
             </a:r>
             <a:endParaRPr lang="en-US" dirty="0"/>
           </a:p>
@@ -3197,14 +3235,14 @@
       </p:sp>
       <p:cxnSp>
         <p:nvCxnSpPr>
-          <p:cNvPr id="15" name="Straight Arrow Connector 14"/>
+          <p:cNvPr id="16" name="Straight Arrow Connector 15"/>
           <p:cNvCxnSpPr/>
           <p:nvPr/>
         </p:nvCxnSpPr>
         <p:spPr>
-          <a:xfrm flipH="1">
-            <a:off x="5257800" y="1719072"/>
-            <a:ext cx="457200" cy="0"/>
+          <a:xfrm flipH="1" flipV="1">
+            <a:off x="3904488" y="4727448"/>
+            <a:ext cx="1024037" cy="9144"/>
           </a:xfrm>
           <a:prstGeom prst="straightConnector1">
             <a:avLst/>
@@ -3214,13 +3252,13 @@
           </a:ln>
         </p:spPr>
         <p:style>
-          <a:lnRef idx="1">
+          <a:lnRef idx="3">
             <a:schemeClr val="dk1"/>
           </a:lnRef>
           <a:fillRef idx="0">
             <a:schemeClr val="dk1"/>
           </a:fillRef>
-          <a:effectRef idx="0">
+          <a:effectRef idx="2">
             <a:schemeClr val="dk1"/>
           </a:effectRef>
           <a:fontRef idx="minor">
@@ -3230,14 +3268,14 @@
       </p:cxnSp>
       <p:sp>
         <p:nvSpPr>
-          <p:cNvPr id="16" name="TextBox 15"/>
+          <p:cNvPr id="17" name="TextBox 16"/>
           <p:cNvSpPr txBox="1"/>
           <p:nvPr/>
         </p:nvSpPr>
         <p:spPr>
           <a:xfrm>
-            <a:off x="3337560" y="5733288"/>
-            <a:ext cx="2850780" cy="369332"/>
+            <a:off x="6859643" y="6089904"/>
+            <a:ext cx="5074531" cy="646331"/>
           </a:xfrm>
           <a:prstGeom prst="rect">
             <a:avLst/>
@@ -3252,7 +3290,17 @@
           <a:p>
             <a:r>
               <a:rPr lang="en-US" dirty="0" smtClean="0"/>
-              <a:t>Step 4: Finalize the selection</a:t>
+              <a:t>Feature can be unselected, if they violate any model</a:t>
+            </a:r>
+          </a:p>
+          <a:p>
+            <a:r>
+              <a:rPr lang="en-US" dirty="0"/>
+              <a:t>a</a:t>
+            </a:r>
+            <a:r>
+              <a:rPr lang="en-US" dirty="0" smtClean="0"/>
+              <a:t>ssumption. Do re-run the LASSO, after un-selection</a:t>
             </a:r>
             <a:endParaRPr lang="en-US" dirty="0"/>
           </a:p>
@@ -3260,30 +3308,32 @@
       </p:sp>
       <p:cxnSp>
         <p:nvCxnSpPr>
-          <p:cNvPr id="20" name="Straight Arrow Connector 19"/>
+          <p:cNvPr id="21" name="Elbow Connector 20"/>
           <p:cNvCxnSpPr/>
           <p:nvPr/>
         </p:nvCxnSpPr>
         <p:spPr>
-          <a:xfrm flipH="1">
-            <a:off x="3099816" y="5917954"/>
-            <a:ext cx="237744" cy="0"/>
-          </a:xfrm>
-          <a:prstGeom prst="straightConnector1">
-            <a:avLst/>
+          <a:xfrm rot="16200000" flipV="1">
+            <a:off x="10007483" y="4429643"/>
+            <a:ext cx="2579859" cy="667512"/>
+          </a:xfrm>
+          <a:prstGeom prst="bentConnector3">
+            <a:avLst>
+              <a:gd name="adj1" fmla="val 100685"/>
+            </a:avLst>
           </a:prstGeom>
           <a:ln>
             <a:tailEnd type="triangle"/>
           </a:ln>
         </p:spPr>
         <p:style>
-          <a:lnRef idx="1">
+          <a:lnRef idx="3">
             <a:schemeClr val="dk1"/>
           </a:lnRef>
           <a:fillRef idx="0">
             <a:schemeClr val="dk1"/>
           </a:fillRef>
-          <a:effectRef idx="0">
+          <a:effectRef idx="2">
             <a:schemeClr val="dk1"/>
           </a:effectRef>
           <a:fontRef idx="minor">
@@ -3294,13 +3344,1284 @@
     </p:spTree>
     <p:extLst>
       <p:ext uri="{BB962C8B-B14F-4D97-AF65-F5344CB8AC3E}">
-        <p14:creationId xmlns:p14="http://schemas.microsoft.com/office/powerpoint/2010/main" val="3470477863"/>
+        <p14:creationId xmlns:p14="http://schemas.microsoft.com/office/powerpoint/2010/main" val="426327728"/>
       </p:ext>
     </p:extLst>
   </p:cSld>
   <p:clrMapOvr>
     <a:masterClrMapping/>
   </p:clrMapOvr>
+</p:sld>
+</file>
+
+<file path=ppt/slides/slide11.xml><?xml version="1.0" encoding="utf-8"?>
+<p:sld xmlns:a="http://schemas.openxmlformats.org/drawingml/2006/main" xmlns:r="http://schemas.openxmlformats.org/officeDocument/2006/relationships" xmlns:p="http://schemas.openxmlformats.org/presentationml/2006/main">
+  <p:cSld>
+    <p:spTree>
+      <p:nvGrpSpPr>
+        <p:cNvPr id="1" name=""/>
+        <p:cNvGrpSpPr/>
+        <p:nvPr/>
+      </p:nvGrpSpPr>
+      <p:grpSpPr>
+        <a:xfrm>
+          <a:off x="0" y="0"/>
+          <a:ext cx="0" cy="0"/>
+          <a:chOff x="0" y="0"/>
+          <a:chExt cx="0" cy="0"/>
+        </a:xfrm>
+      </p:grpSpPr>
+      <p:pic>
+        <p:nvPicPr>
+          <p:cNvPr id="4" name="Picture 3"/>
+          <p:cNvPicPr>
+            <a:picLocks noChangeAspect="1"/>
+          </p:cNvPicPr>
+          <p:nvPr/>
+        </p:nvPicPr>
+        <p:blipFill>
+          <a:blip r:embed="rId2"/>
+          <a:stretch>
+            <a:fillRect/>
+          </a:stretch>
+        </p:blipFill>
+        <p:spPr>
+          <a:xfrm>
+            <a:off x="82296" y="451179"/>
+            <a:ext cx="10357674" cy="5904471"/>
+          </a:xfrm>
+          <a:prstGeom prst="rect">
+            <a:avLst/>
+          </a:prstGeom>
+        </p:spPr>
+      </p:pic>
+      <p:sp>
+        <p:nvSpPr>
+          <p:cNvPr id="5" name="TextBox 4"/>
+          <p:cNvSpPr txBox="1"/>
+          <p:nvPr/>
+        </p:nvSpPr>
+        <p:spPr>
+          <a:xfrm>
+            <a:off x="4247290" y="1645920"/>
+            <a:ext cx="4646593" cy="369332"/>
+          </a:xfrm>
+          <a:prstGeom prst="rect">
+            <a:avLst/>
+          </a:prstGeom>
+          <a:noFill/>
+        </p:spPr>
+        <p:txBody>
+          <a:bodyPr wrap="none" rtlCol="0">
+            <a:spAutoFit/>
+          </a:bodyPr>
+          <a:lstStyle/>
+          <a:p>
+            <a:r>
+              <a:rPr lang="en-US" dirty="0" smtClean="0"/>
+              <a:t>^ Methods to compare the linear model against</a:t>
+            </a:r>
+            <a:endParaRPr lang="en-US" dirty="0"/>
+          </a:p>
+        </p:txBody>
+      </p:sp>
+      <p:sp>
+        <p:nvSpPr>
+          <p:cNvPr id="7" name="Left Brace 6"/>
+          <p:cNvSpPr/>
+          <p:nvPr/>
+        </p:nvSpPr>
+        <p:spPr>
+          <a:xfrm>
+            <a:off x="1837944" y="5157216"/>
+            <a:ext cx="146304" cy="1198434"/>
+          </a:xfrm>
+          <a:prstGeom prst="leftBrace">
+            <a:avLst/>
+          </a:prstGeom>
+        </p:spPr>
+        <p:style>
+          <a:lnRef idx="3">
+            <a:schemeClr val="dk1"/>
+          </a:lnRef>
+          <a:fillRef idx="0">
+            <a:schemeClr val="dk1"/>
+          </a:fillRef>
+          <a:effectRef idx="2">
+            <a:schemeClr val="dk1"/>
+          </a:effectRef>
+          <a:fontRef idx="minor">
+            <a:schemeClr val="tx1"/>
+          </a:fontRef>
+        </p:style>
+        <p:txBody>
+          <a:bodyPr rtlCol="0" anchor="ctr"/>
+          <a:lstStyle/>
+          <a:p>
+            <a:pPr algn="ctr"/>
+            <a:endParaRPr lang="en-US"/>
+          </a:p>
+        </p:txBody>
+      </p:sp>
+      <p:sp>
+        <p:nvSpPr>
+          <p:cNvPr id="8" name="TextBox 7"/>
+          <p:cNvSpPr txBox="1"/>
+          <p:nvPr/>
+        </p:nvSpPr>
+        <p:spPr>
+          <a:xfrm>
+            <a:off x="35967" y="5358384"/>
+            <a:ext cx="1663917" cy="646331"/>
+          </a:xfrm>
+          <a:prstGeom prst="rect">
+            <a:avLst/>
+          </a:prstGeom>
+          <a:noFill/>
+        </p:spPr>
+        <p:txBody>
+          <a:bodyPr wrap="none" rtlCol="0">
+            <a:spAutoFit/>
+          </a:bodyPr>
+          <a:lstStyle/>
+          <a:p>
+            <a:r>
+              <a:rPr lang="en-US" dirty="0" smtClean="0"/>
+              <a:t>Forecast from </a:t>
+            </a:r>
+          </a:p>
+          <a:p>
+            <a:r>
+              <a:rPr lang="en-US" dirty="0" smtClean="0"/>
+              <a:t>Linear Regression</a:t>
+            </a:r>
+            <a:endParaRPr lang="en-US" dirty="0"/>
+          </a:p>
+        </p:txBody>
+      </p:sp>
+      <p:sp>
+        <p:nvSpPr>
+          <p:cNvPr id="9" name="Right Brace 8"/>
+          <p:cNvSpPr/>
+          <p:nvPr/>
+        </p:nvSpPr>
+        <p:spPr>
+          <a:xfrm>
+            <a:off x="8380493" y="5044702"/>
+            <a:ext cx="121706" cy="521208"/>
+          </a:xfrm>
+          <a:prstGeom prst="rightBrace">
+            <a:avLst/>
+          </a:prstGeom>
+        </p:spPr>
+        <p:style>
+          <a:lnRef idx="3">
+            <a:schemeClr val="dk1"/>
+          </a:lnRef>
+          <a:fillRef idx="0">
+            <a:schemeClr val="dk1"/>
+          </a:fillRef>
+          <a:effectRef idx="2">
+            <a:schemeClr val="dk1"/>
+          </a:effectRef>
+          <a:fontRef idx="minor">
+            <a:schemeClr val="tx1"/>
+          </a:fontRef>
+        </p:style>
+        <p:txBody>
+          <a:bodyPr rtlCol="0" anchor="ctr"/>
+          <a:lstStyle/>
+          <a:p>
+            <a:pPr algn="ctr"/>
+            <a:endParaRPr lang="en-US"/>
+          </a:p>
+        </p:txBody>
+      </p:sp>
+      <p:sp>
+        <p:nvSpPr>
+          <p:cNvPr id="10" name="TextBox 9"/>
+          <p:cNvSpPr txBox="1"/>
+          <p:nvPr/>
+        </p:nvSpPr>
+        <p:spPr>
+          <a:xfrm>
+            <a:off x="8511343" y="5108710"/>
+            <a:ext cx="3299814" cy="369332"/>
+          </a:xfrm>
+          <a:prstGeom prst="rect">
+            <a:avLst/>
+          </a:prstGeom>
+          <a:noFill/>
+        </p:spPr>
+        <p:txBody>
+          <a:bodyPr wrap="none" rtlCol="0">
+            <a:spAutoFit/>
+          </a:bodyPr>
+          <a:lstStyle/>
+          <a:p>
+            <a:r>
+              <a:rPr lang="en-US" dirty="0" smtClean="0"/>
+              <a:t>Error metrics for selected models</a:t>
+            </a:r>
+            <a:endParaRPr lang="en-US" dirty="0"/>
+          </a:p>
+        </p:txBody>
+      </p:sp>
+    </p:spTree>
+    <p:extLst>
+      <p:ext uri="{BB962C8B-B14F-4D97-AF65-F5344CB8AC3E}">
+        <p14:creationId xmlns:p14="http://schemas.microsoft.com/office/powerpoint/2010/main" val="3528418855"/>
+      </p:ext>
+    </p:extLst>
+  </p:cSld>
+  <p:clrMapOvr>
+    <a:masterClrMapping/>
+  </p:clrMapOvr>
+</p:sld>
+</file>
+
+<file path=ppt/slides/slide12.xml><?xml version="1.0" encoding="utf-8"?>
+<p:sld xmlns:a="http://schemas.openxmlformats.org/drawingml/2006/main" xmlns:r="http://schemas.openxmlformats.org/officeDocument/2006/relationships" xmlns:p="http://schemas.openxmlformats.org/presentationml/2006/main">
+  <p:cSld>
+    <p:spTree>
+      <p:nvGrpSpPr>
+        <p:cNvPr id="1" name=""/>
+        <p:cNvGrpSpPr/>
+        <p:nvPr/>
+      </p:nvGrpSpPr>
+      <p:grpSpPr>
+        <a:xfrm>
+          <a:off x="0" y="0"/>
+          <a:ext cx="0" cy="0"/>
+          <a:chOff x="0" y="0"/>
+          <a:chExt cx="0" cy="0"/>
+        </a:xfrm>
+      </p:grpSpPr>
+      <p:pic>
+        <p:nvPicPr>
+          <p:cNvPr id="5" name="Picture 4"/>
+          <p:cNvPicPr>
+            <a:picLocks noChangeAspect="1"/>
+          </p:cNvPicPr>
+          <p:nvPr/>
+        </p:nvPicPr>
+        <p:blipFill>
+          <a:blip r:embed="rId2"/>
+          <a:stretch>
+            <a:fillRect/>
+          </a:stretch>
+        </p:blipFill>
+        <p:spPr>
+          <a:xfrm>
+            <a:off x="0" y="388613"/>
+            <a:ext cx="10574148" cy="6282692"/>
+          </a:xfrm>
+          <a:prstGeom prst="rect">
+            <a:avLst/>
+          </a:prstGeom>
+        </p:spPr>
+      </p:pic>
+      <p:sp>
+        <p:nvSpPr>
+          <p:cNvPr id="6" name="Left Brace 5"/>
+          <p:cNvSpPr/>
+          <p:nvPr/>
+        </p:nvSpPr>
+        <p:spPr>
+          <a:xfrm>
+            <a:off x="1965960" y="5405498"/>
+            <a:ext cx="146304" cy="1198434"/>
+          </a:xfrm>
+          <a:prstGeom prst="leftBrace">
+            <a:avLst/>
+          </a:prstGeom>
+        </p:spPr>
+        <p:style>
+          <a:lnRef idx="3">
+            <a:schemeClr val="dk1"/>
+          </a:lnRef>
+          <a:fillRef idx="0">
+            <a:schemeClr val="dk1"/>
+          </a:fillRef>
+          <a:effectRef idx="2">
+            <a:schemeClr val="dk1"/>
+          </a:effectRef>
+          <a:fontRef idx="minor">
+            <a:schemeClr val="tx1"/>
+          </a:fontRef>
+        </p:style>
+        <p:txBody>
+          <a:bodyPr rtlCol="0" anchor="ctr"/>
+          <a:lstStyle/>
+          <a:p>
+            <a:pPr algn="ctr"/>
+            <a:endParaRPr lang="en-US"/>
+          </a:p>
+        </p:txBody>
+      </p:sp>
+      <p:sp>
+        <p:nvSpPr>
+          <p:cNvPr id="7" name="TextBox 6"/>
+          <p:cNvSpPr txBox="1"/>
+          <p:nvPr/>
+        </p:nvSpPr>
+        <p:spPr>
+          <a:xfrm>
+            <a:off x="434707" y="5623170"/>
+            <a:ext cx="1531253" cy="646331"/>
+          </a:xfrm>
+          <a:prstGeom prst="rect">
+            <a:avLst/>
+          </a:prstGeom>
+          <a:noFill/>
+        </p:spPr>
+        <p:txBody>
+          <a:bodyPr wrap="none" rtlCol="0">
+            <a:spAutoFit/>
+          </a:bodyPr>
+          <a:lstStyle/>
+          <a:p>
+            <a:r>
+              <a:rPr lang="en-US" dirty="0" smtClean="0"/>
+              <a:t>Forecast from </a:t>
+            </a:r>
+          </a:p>
+          <a:p>
+            <a:r>
+              <a:rPr lang="en-US" dirty="0" smtClean="0"/>
+              <a:t>Time Series</a:t>
+            </a:r>
+          </a:p>
+        </p:txBody>
+      </p:sp>
+      <p:sp>
+        <p:nvSpPr>
+          <p:cNvPr id="8" name="Right Brace 7"/>
+          <p:cNvSpPr/>
+          <p:nvPr/>
+        </p:nvSpPr>
+        <p:spPr>
+          <a:xfrm>
+            <a:off x="6697997" y="5233351"/>
+            <a:ext cx="68563" cy="344294"/>
+          </a:xfrm>
+          <a:prstGeom prst="rightBrace">
+            <a:avLst/>
+          </a:prstGeom>
+        </p:spPr>
+        <p:style>
+          <a:lnRef idx="3">
+            <a:schemeClr val="dk1"/>
+          </a:lnRef>
+          <a:fillRef idx="0">
+            <a:schemeClr val="dk1"/>
+          </a:fillRef>
+          <a:effectRef idx="2">
+            <a:schemeClr val="dk1"/>
+          </a:effectRef>
+          <a:fontRef idx="minor">
+            <a:schemeClr val="tx1"/>
+          </a:fontRef>
+        </p:style>
+        <p:txBody>
+          <a:bodyPr rtlCol="0" anchor="ctr"/>
+          <a:lstStyle/>
+          <a:p>
+            <a:pPr algn="ctr"/>
+            <a:endParaRPr lang="en-US"/>
+          </a:p>
+        </p:txBody>
+      </p:sp>
+      <p:sp>
+        <p:nvSpPr>
+          <p:cNvPr id="9" name="TextBox 8"/>
+          <p:cNvSpPr txBox="1"/>
+          <p:nvPr/>
+        </p:nvSpPr>
+        <p:spPr>
+          <a:xfrm>
+            <a:off x="6847135" y="5208313"/>
+            <a:ext cx="2831031" cy="369332"/>
+          </a:xfrm>
+          <a:prstGeom prst="rect">
+            <a:avLst/>
+          </a:prstGeom>
+          <a:noFill/>
+        </p:spPr>
+        <p:txBody>
+          <a:bodyPr wrap="none" rtlCol="0">
+            <a:spAutoFit/>
+          </a:bodyPr>
+          <a:lstStyle/>
+          <a:p>
+            <a:r>
+              <a:rPr lang="en-US" dirty="0" smtClean="0"/>
+              <a:t>Error metrics for the models</a:t>
+            </a:r>
+            <a:endParaRPr lang="en-US" dirty="0"/>
+          </a:p>
+        </p:txBody>
+      </p:sp>
+    </p:spTree>
+    <p:extLst>
+      <p:ext uri="{BB962C8B-B14F-4D97-AF65-F5344CB8AC3E}">
+        <p14:creationId xmlns:p14="http://schemas.microsoft.com/office/powerpoint/2010/main" val="3983954609"/>
+      </p:ext>
+    </p:extLst>
+  </p:cSld>
+  <p:clrMapOvr>
+    <a:masterClrMapping/>
+  </p:clrMapOvr>
+  <p:timing>
+    <p:tnLst>
+      <p:par>
+        <p:cTn id="1" dur="indefinite" restart="never" nodeType="tmRoot"/>
+      </p:par>
+    </p:tnLst>
+  </p:timing>
+</p:sld>
+</file>
+
+<file path=ppt/slides/slide13.xml><?xml version="1.0" encoding="utf-8"?>
+<p:sld xmlns:a="http://schemas.openxmlformats.org/drawingml/2006/main" xmlns:r="http://schemas.openxmlformats.org/officeDocument/2006/relationships" xmlns:p="http://schemas.openxmlformats.org/presentationml/2006/main">
+  <p:cSld>
+    <p:spTree>
+      <p:nvGrpSpPr>
+        <p:cNvPr id="1" name=""/>
+        <p:cNvGrpSpPr/>
+        <p:nvPr/>
+      </p:nvGrpSpPr>
+      <p:grpSpPr>
+        <a:xfrm>
+          <a:off x="0" y="0"/>
+          <a:ext cx="0" cy="0"/>
+          <a:chOff x="0" y="0"/>
+          <a:chExt cx="0" cy="0"/>
+        </a:xfrm>
+      </p:grpSpPr>
+      <p:pic>
+        <p:nvPicPr>
+          <p:cNvPr id="4" name="Picture 3"/>
+          <p:cNvPicPr>
+            <a:picLocks noChangeAspect="1"/>
+          </p:cNvPicPr>
+          <p:nvPr/>
+        </p:nvPicPr>
+        <p:blipFill>
+          <a:blip r:embed="rId2"/>
+          <a:stretch>
+            <a:fillRect/>
+          </a:stretch>
+        </p:blipFill>
+        <p:spPr>
+          <a:xfrm>
+            <a:off x="0" y="0"/>
+            <a:ext cx="11122152" cy="6418542"/>
+          </a:xfrm>
+          <a:prstGeom prst="rect">
+            <a:avLst/>
+          </a:prstGeom>
+        </p:spPr>
+      </p:pic>
+      <p:sp>
+        <p:nvSpPr>
+          <p:cNvPr id="5" name="TextBox 4"/>
+          <p:cNvSpPr txBox="1"/>
+          <p:nvPr/>
+        </p:nvSpPr>
+        <p:spPr>
+          <a:xfrm>
+            <a:off x="2432304" y="1143000"/>
+            <a:ext cx="8155118" cy="369332"/>
+          </a:xfrm>
+          <a:prstGeom prst="rect">
+            <a:avLst/>
+          </a:prstGeom>
+          <a:noFill/>
+        </p:spPr>
+        <p:txBody>
+          <a:bodyPr wrap="none" rtlCol="0">
+            <a:spAutoFit/>
+          </a:bodyPr>
+          <a:lstStyle/>
+          <a:p>
+            <a:r>
+              <a:rPr lang="en-US" dirty="0" smtClean="0"/>
+              <a:t>^ Models to plot and ensemble. Make sure the corresponding models have been built</a:t>
+            </a:r>
+          </a:p>
+        </p:txBody>
+      </p:sp>
+      <p:sp>
+        <p:nvSpPr>
+          <p:cNvPr id="6" name="Left Brace 5"/>
+          <p:cNvSpPr/>
+          <p:nvPr/>
+        </p:nvSpPr>
+        <p:spPr>
+          <a:xfrm>
+            <a:off x="2039112" y="5137572"/>
+            <a:ext cx="146304" cy="1198434"/>
+          </a:xfrm>
+          <a:prstGeom prst="leftBrace">
+            <a:avLst/>
+          </a:prstGeom>
+        </p:spPr>
+        <p:style>
+          <a:lnRef idx="3">
+            <a:schemeClr val="dk1"/>
+          </a:lnRef>
+          <a:fillRef idx="0">
+            <a:schemeClr val="dk1"/>
+          </a:fillRef>
+          <a:effectRef idx="2">
+            <a:schemeClr val="dk1"/>
+          </a:effectRef>
+          <a:fontRef idx="minor">
+            <a:schemeClr val="tx1"/>
+          </a:fontRef>
+        </p:style>
+        <p:txBody>
+          <a:bodyPr rtlCol="0" anchor="ctr"/>
+          <a:lstStyle/>
+          <a:p>
+            <a:pPr algn="ctr"/>
+            <a:endParaRPr lang="en-US"/>
+          </a:p>
+        </p:txBody>
+      </p:sp>
+      <p:sp>
+        <p:nvSpPr>
+          <p:cNvPr id="7" name="TextBox 6"/>
+          <p:cNvSpPr txBox="1"/>
+          <p:nvPr/>
+        </p:nvSpPr>
+        <p:spPr>
+          <a:xfrm>
+            <a:off x="42329" y="4859626"/>
+            <a:ext cx="2172454" cy="1477328"/>
+          </a:xfrm>
+          <a:prstGeom prst="rect">
+            <a:avLst/>
+          </a:prstGeom>
+          <a:noFill/>
+        </p:spPr>
+        <p:txBody>
+          <a:bodyPr wrap="none" rtlCol="0">
+            <a:spAutoFit/>
+          </a:bodyPr>
+          <a:lstStyle/>
+          <a:p>
+            <a:r>
+              <a:rPr lang="en-US" dirty="0" smtClean="0"/>
+              <a:t>Forecast from</a:t>
+            </a:r>
+          </a:p>
+          <a:p>
+            <a:r>
+              <a:rPr lang="en-US" dirty="0"/>
+              <a:t>m</a:t>
+            </a:r>
+            <a:r>
+              <a:rPr lang="en-US" dirty="0" smtClean="0"/>
+              <a:t>odels. Red </a:t>
+            </a:r>
+          </a:p>
+          <a:p>
+            <a:r>
+              <a:rPr lang="en-US" dirty="0" smtClean="0"/>
+              <a:t>Indicates the worst</a:t>
+            </a:r>
+          </a:p>
+          <a:p>
+            <a:r>
+              <a:rPr lang="en-US" dirty="0" smtClean="0"/>
+              <a:t>prediction and green</a:t>
+            </a:r>
+          </a:p>
+          <a:p>
+            <a:r>
+              <a:rPr lang="en-US" dirty="0" smtClean="0"/>
+              <a:t>the best for a month</a:t>
+            </a:r>
+            <a:endParaRPr lang="en-US" dirty="0"/>
+          </a:p>
+        </p:txBody>
+      </p:sp>
+    </p:spTree>
+    <p:extLst>
+      <p:ext uri="{BB962C8B-B14F-4D97-AF65-F5344CB8AC3E}">
+        <p14:creationId xmlns:p14="http://schemas.microsoft.com/office/powerpoint/2010/main" val="2166817487"/>
+      </p:ext>
+    </p:extLst>
+  </p:cSld>
+  <p:clrMapOvr>
+    <a:masterClrMapping/>
+  </p:clrMapOvr>
+  <p:timing>
+    <p:tnLst>
+      <p:par>
+        <p:cTn id="1" dur="indefinite" restart="never" nodeType="tmRoot"/>
+      </p:par>
+    </p:tnLst>
+  </p:timing>
+</p:sld>
+</file>
+
+<file path=ppt/slides/slide14.xml><?xml version="1.0" encoding="utf-8"?>
+<p:sld xmlns:a="http://schemas.openxmlformats.org/drawingml/2006/main" xmlns:r="http://schemas.openxmlformats.org/officeDocument/2006/relationships" xmlns:p="http://schemas.openxmlformats.org/presentationml/2006/main">
+  <p:cSld>
+    <p:spTree>
+      <p:nvGrpSpPr>
+        <p:cNvPr id="1" name=""/>
+        <p:cNvGrpSpPr/>
+        <p:nvPr/>
+      </p:nvGrpSpPr>
+      <p:grpSpPr>
+        <a:xfrm>
+          <a:off x="0" y="0"/>
+          <a:ext cx="0" cy="0"/>
+          <a:chOff x="0" y="0"/>
+          <a:chExt cx="0" cy="0"/>
+        </a:xfrm>
+      </p:grpSpPr>
+      <p:sp>
+        <p:nvSpPr>
+          <p:cNvPr id="2" name="Title 1"/>
+          <p:cNvSpPr>
+            <a:spLocks noGrp="1"/>
+          </p:cNvSpPr>
+          <p:nvPr>
+            <p:ph type="title"/>
+          </p:nvPr>
+        </p:nvSpPr>
+        <p:spPr>
+          <a:xfrm>
+            <a:off x="819912" y="2376805"/>
+            <a:ext cx="10515600" cy="1325563"/>
+          </a:xfrm>
+        </p:spPr>
+        <p:txBody>
+          <a:bodyPr/>
+          <a:lstStyle/>
+          <a:p>
+            <a:pPr algn="ctr"/>
+            <a:r>
+              <a:rPr lang="en-US" dirty="0" smtClean="0"/>
+              <a:t>Step V : Forecast</a:t>
+            </a:r>
+            <a:endParaRPr lang="en-US" dirty="0"/>
+          </a:p>
+        </p:txBody>
+      </p:sp>
+    </p:spTree>
+    <p:extLst>
+      <p:ext uri="{BB962C8B-B14F-4D97-AF65-F5344CB8AC3E}">
+        <p14:creationId xmlns:p14="http://schemas.microsoft.com/office/powerpoint/2010/main" val="117114711"/>
+      </p:ext>
+    </p:extLst>
+  </p:cSld>
+  <p:clrMapOvr>
+    <a:masterClrMapping/>
+  </p:clrMapOvr>
+  <p:timing>
+    <p:tnLst>
+      <p:par>
+        <p:cTn id="1" dur="indefinite" restart="never" nodeType="tmRoot"/>
+      </p:par>
+    </p:tnLst>
+  </p:timing>
+</p:sld>
+</file>
+
+<file path=ppt/slides/slide15.xml><?xml version="1.0" encoding="utf-8"?>
+<p:sld xmlns:a="http://schemas.openxmlformats.org/drawingml/2006/main" xmlns:r="http://schemas.openxmlformats.org/officeDocument/2006/relationships" xmlns:p="http://schemas.openxmlformats.org/presentationml/2006/main">
+  <p:cSld>
+    <p:spTree>
+      <p:nvGrpSpPr>
+        <p:cNvPr id="1" name=""/>
+        <p:cNvGrpSpPr/>
+        <p:nvPr/>
+      </p:nvGrpSpPr>
+      <p:grpSpPr>
+        <a:xfrm>
+          <a:off x="0" y="0"/>
+          <a:ext cx="0" cy="0"/>
+          <a:chOff x="0" y="0"/>
+          <a:chExt cx="0" cy="0"/>
+        </a:xfrm>
+      </p:grpSpPr>
+      <p:pic>
+        <p:nvPicPr>
+          <p:cNvPr id="4" name="Picture 3"/>
+          <p:cNvPicPr>
+            <a:picLocks noChangeAspect="1"/>
+          </p:cNvPicPr>
+          <p:nvPr/>
+        </p:nvPicPr>
+        <p:blipFill>
+          <a:blip r:embed="rId2"/>
+          <a:stretch>
+            <a:fillRect/>
+          </a:stretch>
+        </p:blipFill>
+        <p:spPr>
+          <a:xfrm>
+            <a:off x="91440" y="464510"/>
+            <a:ext cx="11978757" cy="5643468"/>
+          </a:xfrm>
+          <a:prstGeom prst="rect">
+            <a:avLst/>
+          </a:prstGeom>
+        </p:spPr>
+      </p:pic>
+      <p:sp>
+        <p:nvSpPr>
+          <p:cNvPr id="5" name="TextBox 4"/>
+          <p:cNvSpPr txBox="1"/>
+          <p:nvPr/>
+        </p:nvSpPr>
+        <p:spPr>
+          <a:xfrm>
+            <a:off x="-54864" y="2203812"/>
+            <a:ext cx="2714461" cy="923330"/>
+          </a:xfrm>
+          <a:prstGeom prst="rect">
+            <a:avLst/>
+          </a:prstGeom>
+          <a:noFill/>
+        </p:spPr>
+        <p:txBody>
+          <a:bodyPr wrap="none" rtlCol="0">
+            <a:spAutoFit/>
+          </a:bodyPr>
+          <a:lstStyle/>
+          <a:p>
+            <a:r>
+              <a:rPr lang="en-US" dirty="0" smtClean="0"/>
+              <a:t>Step #1: For each </a:t>
+            </a:r>
+            <a:r>
+              <a:rPr lang="en-US" dirty="0" err="1" smtClean="0"/>
+              <a:t>monthX</a:t>
+            </a:r>
+            <a:r>
+              <a:rPr lang="en-US" dirty="0" smtClean="0"/>
+              <a:t>, </a:t>
+            </a:r>
+          </a:p>
+          <a:p>
+            <a:r>
+              <a:rPr lang="en-US" dirty="0"/>
+              <a:t>s</a:t>
+            </a:r>
+            <a:r>
+              <a:rPr lang="en-US" dirty="0" smtClean="0"/>
+              <a:t>elect if the corresponding</a:t>
+            </a:r>
+          </a:p>
+          <a:p>
+            <a:r>
+              <a:rPr lang="en-US" dirty="0"/>
+              <a:t>m</a:t>
+            </a:r>
+            <a:r>
+              <a:rPr lang="en-US" dirty="0" smtClean="0"/>
+              <a:t>onth is </a:t>
+            </a:r>
+            <a:r>
+              <a:rPr lang="en-US" dirty="0" err="1" smtClean="0"/>
+              <a:t>Xth</a:t>
+            </a:r>
+            <a:r>
+              <a:rPr lang="en-US" dirty="0" smtClean="0"/>
+              <a:t> in a year</a:t>
+            </a:r>
+            <a:endParaRPr lang="en-US" dirty="0"/>
+          </a:p>
+        </p:txBody>
+      </p:sp>
+      <p:cxnSp>
+        <p:nvCxnSpPr>
+          <p:cNvPr id="7" name="Straight Arrow Connector 6"/>
+          <p:cNvCxnSpPr/>
+          <p:nvPr/>
+        </p:nvCxnSpPr>
+        <p:spPr>
+          <a:xfrm>
+            <a:off x="1865376" y="2532888"/>
+            <a:ext cx="210312" cy="0"/>
+          </a:xfrm>
+          <a:prstGeom prst="straightConnector1">
+            <a:avLst/>
+          </a:prstGeom>
+          <a:ln>
+            <a:tailEnd type="triangle"/>
+          </a:ln>
+        </p:spPr>
+        <p:style>
+          <a:lnRef idx="3">
+            <a:schemeClr val="dk1"/>
+          </a:lnRef>
+          <a:fillRef idx="0">
+            <a:schemeClr val="dk1"/>
+          </a:fillRef>
+          <a:effectRef idx="2">
+            <a:schemeClr val="dk1"/>
+          </a:effectRef>
+          <a:fontRef idx="minor">
+            <a:schemeClr val="tx1"/>
+          </a:fontRef>
+        </p:style>
+      </p:cxnSp>
+      <p:sp>
+        <p:nvSpPr>
+          <p:cNvPr id="8" name="TextBox 7"/>
+          <p:cNvSpPr txBox="1"/>
+          <p:nvPr/>
+        </p:nvSpPr>
+        <p:spPr>
+          <a:xfrm>
+            <a:off x="0" y="4211366"/>
+            <a:ext cx="4063998" cy="1754326"/>
+          </a:xfrm>
+          <a:prstGeom prst="rect">
+            <a:avLst/>
+          </a:prstGeom>
+          <a:noFill/>
+        </p:spPr>
+        <p:txBody>
+          <a:bodyPr wrap="none" rtlCol="0">
+            <a:spAutoFit/>
+          </a:bodyPr>
+          <a:lstStyle/>
+          <a:p>
+            <a:r>
+              <a:rPr lang="en-US" dirty="0" smtClean="0"/>
+              <a:t>Step #2: For each of the continuous </a:t>
+            </a:r>
+          </a:p>
+          <a:p>
+            <a:r>
+              <a:rPr lang="en-US" dirty="0"/>
+              <a:t>v</a:t>
+            </a:r>
+            <a:r>
+              <a:rPr lang="en-US" dirty="0" smtClean="0"/>
+              <a:t>ariable, click the button to use</a:t>
+            </a:r>
+          </a:p>
+          <a:p>
+            <a:r>
+              <a:rPr lang="en-US" dirty="0" smtClean="0"/>
+              <a:t>ARIMA for forecasting its values.</a:t>
+            </a:r>
+          </a:p>
+          <a:p>
+            <a:r>
+              <a:rPr lang="en-US" dirty="0" smtClean="0"/>
+              <a:t>If a better reliable source is available,</a:t>
+            </a:r>
+          </a:p>
+          <a:p>
+            <a:r>
+              <a:rPr lang="en-US" dirty="0" smtClean="0"/>
+              <a:t>they can be entered in the corresponding</a:t>
+            </a:r>
+          </a:p>
+          <a:p>
+            <a:r>
+              <a:rPr lang="en-US" dirty="0"/>
+              <a:t>t</a:t>
+            </a:r>
+            <a:r>
+              <a:rPr lang="en-US" dirty="0" smtClean="0"/>
+              <a:t>ext box.</a:t>
+            </a:r>
+            <a:endParaRPr lang="en-US" dirty="0"/>
+          </a:p>
+        </p:txBody>
+      </p:sp>
+      <p:cxnSp>
+        <p:nvCxnSpPr>
+          <p:cNvPr id="10" name="Elbow Connector 9"/>
+          <p:cNvCxnSpPr/>
+          <p:nvPr/>
+        </p:nvCxnSpPr>
+        <p:spPr>
+          <a:xfrm rot="5400000" flipH="1" flipV="1">
+            <a:off x="1456182" y="3646170"/>
+            <a:ext cx="621792" cy="406908"/>
+          </a:xfrm>
+          <a:prstGeom prst="bentConnector3">
+            <a:avLst>
+              <a:gd name="adj1" fmla="val 102941"/>
+            </a:avLst>
+          </a:prstGeom>
+          <a:ln>
+            <a:tailEnd type="triangle"/>
+          </a:ln>
+        </p:spPr>
+        <p:style>
+          <a:lnRef idx="3">
+            <a:schemeClr val="dk1"/>
+          </a:lnRef>
+          <a:fillRef idx="0">
+            <a:schemeClr val="dk1"/>
+          </a:fillRef>
+          <a:effectRef idx="2">
+            <a:schemeClr val="dk1"/>
+          </a:effectRef>
+          <a:fontRef idx="minor">
+            <a:schemeClr val="tx1"/>
+          </a:fontRef>
+        </p:style>
+      </p:cxnSp>
+    </p:spTree>
+    <p:extLst>
+      <p:ext uri="{BB962C8B-B14F-4D97-AF65-F5344CB8AC3E}">
+        <p14:creationId xmlns:p14="http://schemas.microsoft.com/office/powerpoint/2010/main" val="115706522"/>
+      </p:ext>
+    </p:extLst>
+  </p:cSld>
+  <p:clrMapOvr>
+    <a:masterClrMapping/>
+  </p:clrMapOvr>
+  <p:timing>
+    <p:tnLst>
+      <p:par>
+        <p:cTn id="1" dur="indefinite" restart="never" nodeType="tmRoot"/>
+      </p:par>
+    </p:tnLst>
+  </p:timing>
+</p:sld>
+</file>
+
+<file path=ppt/slides/slide16.xml><?xml version="1.0" encoding="utf-8"?>
+<p:sld xmlns:a="http://schemas.openxmlformats.org/drawingml/2006/main" xmlns:r="http://schemas.openxmlformats.org/officeDocument/2006/relationships" xmlns:p="http://schemas.openxmlformats.org/presentationml/2006/main">
+  <p:cSld>
+    <p:spTree>
+      <p:nvGrpSpPr>
+        <p:cNvPr id="1" name=""/>
+        <p:cNvGrpSpPr/>
+        <p:nvPr/>
+      </p:nvGrpSpPr>
+      <p:grpSpPr>
+        <a:xfrm>
+          <a:off x="0" y="0"/>
+          <a:ext cx="0" cy="0"/>
+          <a:chOff x="0" y="0"/>
+          <a:chExt cx="0" cy="0"/>
+        </a:xfrm>
+      </p:grpSpPr>
+      <p:pic>
+        <p:nvPicPr>
+          <p:cNvPr id="4" name="Picture 3"/>
+          <p:cNvPicPr>
+            <a:picLocks noChangeAspect="1"/>
+          </p:cNvPicPr>
+          <p:nvPr/>
+        </p:nvPicPr>
+        <p:blipFill>
+          <a:blip r:embed="rId2"/>
+          <a:stretch>
+            <a:fillRect/>
+          </a:stretch>
+        </p:blipFill>
+        <p:spPr>
+          <a:xfrm>
+            <a:off x="869116" y="1492899"/>
+            <a:ext cx="10861989" cy="3954332"/>
+          </a:xfrm>
+          <a:prstGeom prst="rect">
+            <a:avLst/>
+          </a:prstGeom>
+        </p:spPr>
+      </p:pic>
+      <p:sp>
+        <p:nvSpPr>
+          <p:cNvPr id="5" name="TextBox 4"/>
+          <p:cNvSpPr txBox="1"/>
+          <p:nvPr/>
+        </p:nvSpPr>
+        <p:spPr>
+          <a:xfrm>
+            <a:off x="4627984" y="149290"/>
+            <a:ext cx="1520544" cy="369332"/>
+          </a:xfrm>
+          <a:prstGeom prst="rect">
+            <a:avLst/>
+          </a:prstGeom>
+          <a:noFill/>
+        </p:spPr>
+        <p:txBody>
+          <a:bodyPr wrap="none" rtlCol="0">
+            <a:spAutoFit/>
+          </a:bodyPr>
+          <a:lstStyle/>
+          <a:p>
+            <a:r>
+              <a:rPr lang="en-US" dirty="0" smtClean="0"/>
+              <a:t>Continuation..</a:t>
+            </a:r>
+            <a:endParaRPr lang="en-US" dirty="0"/>
+          </a:p>
+        </p:txBody>
+      </p:sp>
+      <p:sp>
+        <p:nvSpPr>
+          <p:cNvPr id="6" name="TextBox 5"/>
+          <p:cNvSpPr txBox="1"/>
+          <p:nvPr/>
+        </p:nvSpPr>
+        <p:spPr>
+          <a:xfrm>
+            <a:off x="869116" y="1162936"/>
+            <a:ext cx="9241504" cy="369332"/>
+          </a:xfrm>
+          <a:prstGeom prst="rect">
+            <a:avLst/>
+          </a:prstGeom>
+          <a:noFill/>
+        </p:spPr>
+        <p:txBody>
+          <a:bodyPr wrap="none" rtlCol="0">
+            <a:spAutoFit/>
+          </a:bodyPr>
+          <a:lstStyle/>
+          <a:p>
+            <a:r>
+              <a:rPr lang="en-US" dirty="0" smtClean="0"/>
+              <a:t>Step #3: Click “Forecast”. The predictions for the next year are shown in the plot and table below</a:t>
+            </a:r>
+            <a:endParaRPr lang="en-US" dirty="0"/>
+          </a:p>
+        </p:txBody>
+      </p:sp>
+      <p:sp>
+        <p:nvSpPr>
+          <p:cNvPr id="7" name="TextBox 6"/>
+          <p:cNvSpPr txBox="1"/>
+          <p:nvPr/>
+        </p:nvSpPr>
+        <p:spPr>
+          <a:xfrm>
+            <a:off x="869116" y="6013766"/>
+            <a:ext cx="6552884" cy="369332"/>
+          </a:xfrm>
+          <a:prstGeom prst="rect">
+            <a:avLst/>
+          </a:prstGeom>
+          <a:noFill/>
+        </p:spPr>
+        <p:txBody>
+          <a:bodyPr wrap="none" rtlCol="0">
+            <a:spAutoFit/>
+          </a:bodyPr>
+          <a:lstStyle/>
+          <a:p>
+            <a:r>
+              <a:rPr lang="en-US" dirty="0" smtClean="0"/>
+              <a:t>Step #4: Perform the similar operation for all other available models</a:t>
+            </a:r>
+            <a:endParaRPr lang="en-US" dirty="0"/>
+          </a:p>
+        </p:txBody>
+      </p:sp>
+    </p:spTree>
+    <p:extLst>
+      <p:ext uri="{BB962C8B-B14F-4D97-AF65-F5344CB8AC3E}">
+        <p14:creationId xmlns:p14="http://schemas.microsoft.com/office/powerpoint/2010/main" val="693143317"/>
+      </p:ext>
+    </p:extLst>
+  </p:cSld>
+  <p:clrMapOvr>
+    <a:masterClrMapping/>
+  </p:clrMapOvr>
+  <p:timing>
+    <p:tnLst>
+      <p:par>
+        <p:cTn id="1" dur="indefinite" restart="never" nodeType="tmRoot"/>
+      </p:par>
+    </p:tnLst>
+  </p:timing>
+</p:sld>
+</file>
+
+<file path=ppt/slides/slide17.xml><?xml version="1.0" encoding="utf-8"?>
+<p:sld xmlns:a="http://schemas.openxmlformats.org/drawingml/2006/main" xmlns:r="http://schemas.openxmlformats.org/officeDocument/2006/relationships" xmlns:p="http://schemas.openxmlformats.org/presentationml/2006/main">
+  <p:cSld>
+    <p:spTree>
+      <p:nvGrpSpPr>
+        <p:cNvPr id="1" name=""/>
+        <p:cNvGrpSpPr/>
+        <p:nvPr/>
+      </p:nvGrpSpPr>
+      <p:grpSpPr>
+        <a:xfrm>
+          <a:off x="0" y="0"/>
+          <a:ext cx="0" cy="0"/>
+          <a:chOff x="0" y="0"/>
+          <a:chExt cx="0" cy="0"/>
+        </a:xfrm>
+      </p:grpSpPr>
+      <p:pic>
+        <p:nvPicPr>
+          <p:cNvPr id="4" name="Picture 3"/>
+          <p:cNvPicPr>
+            <a:picLocks noChangeAspect="1"/>
+          </p:cNvPicPr>
+          <p:nvPr/>
+        </p:nvPicPr>
+        <p:blipFill>
+          <a:blip r:embed="rId2"/>
+          <a:stretch>
+            <a:fillRect/>
+          </a:stretch>
+        </p:blipFill>
+        <p:spPr>
+          <a:xfrm>
+            <a:off x="301752" y="388668"/>
+            <a:ext cx="11583449" cy="5949860"/>
+          </a:xfrm>
+          <a:prstGeom prst="rect">
+            <a:avLst/>
+          </a:prstGeom>
+        </p:spPr>
+      </p:pic>
+      <p:sp>
+        <p:nvSpPr>
+          <p:cNvPr id="5" name="TextBox 4"/>
+          <p:cNvSpPr txBox="1"/>
+          <p:nvPr/>
+        </p:nvSpPr>
+        <p:spPr>
+          <a:xfrm>
+            <a:off x="2653439" y="1524622"/>
+            <a:ext cx="9179436" cy="369332"/>
+          </a:xfrm>
+          <a:prstGeom prst="rect">
+            <a:avLst/>
+          </a:prstGeom>
+          <a:noFill/>
+        </p:spPr>
+        <p:txBody>
+          <a:bodyPr wrap="none" rtlCol="0">
+            <a:spAutoFit/>
+          </a:bodyPr>
+          <a:lstStyle/>
+          <a:p>
+            <a:r>
+              <a:rPr lang="en-US" dirty="0" smtClean="0"/>
+              <a:t>^ Select the models to plot and ensemble. </a:t>
+            </a:r>
+            <a:r>
+              <a:rPr lang="en-US" dirty="0"/>
+              <a:t>Make sure the corresponding models have been </a:t>
+            </a:r>
+            <a:r>
+              <a:rPr lang="en-US" dirty="0" smtClean="0"/>
+              <a:t>built.</a:t>
+            </a:r>
+            <a:endParaRPr lang="en-US" dirty="0"/>
+          </a:p>
+        </p:txBody>
+      </p:sp>
+      <p:sp>
+        <p:nvSpPr>
+          <p:cNvPr id="6" name="TextBox 5"/>
+          <p:cNvSpPr txBox="1"/>
+          <p:nvPr/>
+        </p:nvSpPr>
+        <p:spPr>
+          <a:xfrm>
+            <a:off x="548640" y="5248656"/>
+            <a:ext cx="1382623" cy="646331"/>
+          </a:xfrm>
+          <a:prstGeom prst="rect">
+            <a:avLst/>
+          </a:prstGeom>
+          <a:noFill/>
+        </p:spPr>
+        <p:txBody>
+          <a:bodyPr wrap="none" rtlCol="0">
+            <a:spAutoFit/>
+          </a:bodyPr>
+          <a:lstStyle/>
+          <a:p>
+            <a:r>
+              <a:rPr lang="en-US" dirty="0" smtClean="0"/>
+              <a:t>Forecasts for</a:t>
+            </a:r>
+          </a:p>
+          <a:p>
+            <a:r>
+              <a:rPr lang="en-US" dirty="0"/>
+              <a:t>e</a:t>
+            </a:r>
+            <a:r>
+              <a:rPr lang="en-US" dirty="0" smtClean="0"/>
+              <a:t>ach month</a:t>
+            </a:r>
+            <a:endParaRPr lang="en-US" dirty="0"/>
+          </a:p>
+        </p:txBody>
+      </p:sp>
+      <p:sp>
+        <p:nvSpPr>
+          <p:cNvPr id="7" name="Left Brace 6"/>
+          <p:cNvSpPr/>
+          <p:nvPr/>
+        </p:nvSpPr>
+        <p:spPr>
+          <a:xfrm>
+            <a:off x="1878278" y="4965192"/>
+            <a:ext cx="299873" cy="1373336"/>
+          </a:xfrm>
+          <a:prstGeom prst="leftBrace">
+            <a:avLst/>
+          </a:prstGeom>
+        </p:spPr>
+        <p:style>
+          <a:lnRef idx="3">
+            <a:schemeClr val="dk1"/>
+          </a:lnRef>
+          <a:fillRef idx="0">
+            <a:schemeClr val="dk1"/>
+          </a:fillRef>
+          <a:effectRef idx="2">
+            <a:schemeClr val="dk1"/>
+          </a:effectRef>
+          <a:fontRef idx="minor">
+            <a:schemeClr val="tx1"/>
+          </a:fontRef>
+        </p:style>
+        <p:txBody>
+          <a:bodyPr rtlCol="0" anchor="ctr"/>
+          <a:lstStyle/>
+          <a:p>
+            <a:pPr algn="ctr"/>
+            <a:endParaRPr lang="en-US"/>
+          </a:p>
+        </p:txBody>
+      </p:sp>
+    </p:spTree>
+    <p:extLst>
+      <p:ext uri="{BB962C8B-B14F-4D97-AF65-F5344CB8AC3E}">
+        <p14:creationId xmlns:p14="http://schemas.microsoft.com/office/powerpoint/2010/main" val="2528877101"/>
+      </p:ext>
+    </p:extLst>
+  </p:cSld>
+  <p:clrMapOvr>
+    <a:masterClrMapping/>
+  </p:clrMapOvr>
+  <p:timing>
+    <p:tnLst>
+      <p:par>
+        <p:cTn id="1" dur="indefinite" restart="never" nodeType="tmRoot"/>
+      </p:par>
+    </p:tnLst>
+  </p:timing>
 </p:sld>
 </file>
 
@@ -3343,6 +4664,430 @@
         </p:blipFill>
         <p:spPr>
           <a:xfrm>
+            <a:off x="173433" y="59316"/>
+            <a:ext cx="11668048" cy="6734676"/>
+          </a:xfrm>
+          <a:prstGeom prst="rect">
+            <a:avLst/>
+          </a:prstGeom>
+        </p:spPr>
+      </p:pic>
+      <p:sp>
+        <p:nvSpPr>
+          <p:cNvPr id="5" name="TextBox 4"/>
+          <p:cNvSpPr txBox="1"/>
+          <p:nvPr/>
+        </p:nvSpPr>
+        <p:spPr>
+          <a:xfrm>
+            <a:off x="173433" y="1929384"/>
+            <a:ext cx="2292807" cy="646331"/>
+          </a:xfrm>
+          <a:prstGeom prst="rect">
+            <a:avLst/>
+          </a:prstGeom>
+          <a:noFill/>
+        </p:spPr>
+        <p:txBody>
+          <a:bodyPr wrap="none" rtlCol="0">
+            <a:spAutoFit/>
+          </a:bodyPr>
+          <a:lstStyle/>
+          <a:p>
+            <a:r>
+              <a:rPr lang="en-US" dirty="0" smtClean="0"/>
+              <a:t>Step 1: Select Product </a:t>
+            </a:r>
+          </a:p>
+          <a:p>
+            <a:r>
+              <a:rPr lang="en-US" dirty="0"/>
+              <a:t> </a:t>
+            </a:r>
+            <a:r>
+              <a:rPr lang="en-US" dirty="0" smtClean="0"/>
+              <a:t>             Line</a:t>
+            </a:r>
+            <a:endParaRPr lang="en-US" dirty="0"/>
+          </a:p>
+        </p:txBody>
+      </p:sp>
+      <p:cxnSp>
+        <p:nvCxnSpPr>
+          <p:cNvPr id="9" name="Straight Arrow Connector 8"/>
+          <p:cNvCxnSpPr/>
+          <p:nvPr/>
+        </p:nvCxnSpPr>
+        <p:spPr>
+          <a:xfrm flipV="1">
+            <a:off x="1609344" y="1252728"/>
+            <a:ext cx="0" cy="594360"/>
+          </a:xfrm>
+          <a:prstGeom prst="straightConnector1">
+            <a:avLst/>
+          </a:prstGeom>
+          <a:ln>
+            <a:solidFill>
+              <a:schemeClr val="tx1"/>
+            </a:solidFill>
+            <a:tailEnd type="triangle"/>
+          </a:ln>
+        </p:spPr>
+        <p:style>
+          <a:lnRef idx="1">
+            <a:schemeClr val="dk1"/>
+          </a:lnRef>
+          <a:fillRef idx="0">
+            <a:schemeClr val="dk1"/>
+          </a:fillRef>
+          <a:effectRef idx="0">
+            <a:schemeClr val="dk1"/>
+          </a:effectRef>
+          <a:fontRef idx="minor">
+            <a:schemeClr val="tx1"/>
+          </a:fontRef>
+        </p:style>
+      </p:cxnSp>
+      <p:sp>
+        <p:nvSpPr>
+          <p:cNvPr id="10" name="TextBox 9"/>
+          <p:cNvSpPr txBox="1"/>
+          <p:nvPr/>
+        </p:nvSpPr>
+        <p:spPr>
+          <a:xfrm>
+            <a:off x="8311896" y="800100"/>
+            <a:ext cx="3110852" cy="369332"/>
+          </a:xfrm>
+          <a:prstGeom prst="rect">
+            <a:avLst/>
+          </a:prstGeom>
+          <a:noFill/>
+        </p:spPr>
+        <p:txBody>
+          <a:bodyPr wrap="none" rtlCol="0">
+            <a:spAutoFit/>
+          </a:bodyPr>
+          <a:lstStyle/>
+          <a:p>
+            <a:r>
+              <a:rPr lang="en-US" dirty="0" smtClean="0"/>
+              <a:t>Step 2: Select the revenue type</a:t>
+            </a:r>
+            <a:endParaRPr lang="en-US" dirty="0"/>
+          </a:p>
+        </p:txBody>
+      </p:sp>
+      <p:cxnSp>
+        <p:nvCxnSpPr>
+          <p:cNvPr id="12" name="Straight Arrow Connector 11"/>
+          <p:cNvCxnSpPr/>
+          <p:nvPr/>
+        </p:nvCxnSpPr>
+        <p:spPr>
+          <a:xfrm flipH="1">
+            <a:off x="7690104" y="984766"/>
+            <a:ext cx="557784" cy="0"/>
+          </a:xfrm>
+          <a:prstGeom prst="straightConnector1">
+            <a:avLst/>
+          </a:prstGeom>
+          <a:ln>
+            <a:tailEnd type="triangle"/>
+          </a:ln>
+        </p:spPr>
+        <p:style>
+          <a:lnRef idx="1">
+            <a:schemeClr val="dk1"/>
+          </a:lnRef>
+          <a:fillRef idx="0">
+            <a:schemeClr val="dk1"/>
+          </a:fillRef>
+          <a:effectRef idx="0">
+            <a:schemeClr val="dk1"/>
+          </a:effectRef>
+          <a:fontRef idx="minor">
+            <a:schemeClr val="tx1"/>
+          </a:fontRef>
+        </p:style>
+      </p:cxnSp>
+      <p:sp>
+        <p:nvSpPr>
+          <p:cNvPr id="13" name="TextBox 12"/>
+          <p:cNvSpPr txBox="1"/>
+          <p:nvPr/>
+        </p:nvSpPr>
+        <p:spPr>
+          <a:xfrm>
+            <a:off x="5257800" y="1379958"/>
+            <a:ext cx="6435031" cy="1200329"/>
+          </a:xfrm>
+          <a:prstGeom prst="rect">
+            <a:avLst/>
+          </a:prstGeom>
+          <a:noFill/>
+        </p:spPr>
+        <p:txBody>
+          <a:bodyPr wrap="none" rtlCol="0">
+            <a:spAutoFit/>
+          </a:bodyPr>
+          <a:lstStyle/>
+          <a:p>
+            <a:r>
+              <a:rPr lang="en-US" dirty="0" smtClean="0"/>
+              <a:t>Step 3 [Optional] : Select observations to be excluded by </a:t>
+            </a:r>
+          </a:p>
+          <a:p>
+            <a:r>
+              <a:rPr lang="en-US" dirty="0"/>
+              <a:t>	 </a:t>
+            </a:r>
+            <a:r>
+              <a:rPr lang="en-US" dirty="0" smtClean="0"/>
+              <a:t> 	clicking on the data points. Such points</a:t>
+            </a:r>
+          </a:p>
+          <a:p>
+            <a:r>
+              <a:rPr lang="en-US" dirty="0" smtClean="0"/>
+              <a:t>                                   would be listed in the “exclude observations#” </a:t>
+            </a:r>
+          </a:p>
+          <a:p>
+            <a:r>
+              <a:rPr lang="en-US" dirty="0"/>
+              <a:t>	</a:t>
+            </a:r>
+            <a:r>
+              <a:rPr lang="en-US" dirty="0" smtClean="0"/>
+              <a:t>	box. </a:t>
+            </a:r>
+            <a:endParaRPr lang="en-US" dirty="0"/>
+          </a:p>
+        </p:txBody>
+      </p:sp>
+      <p:cxnSp>
+        <p:nvCxnSpPr>
+          <p:cNvPr id="15" name="Straight Arrow Connector 14"/>
+          <p:cNvCxnSpPr/>
+          <p:nvPr/>
+        </p:nvCxnSpPr>
+        <p:spPr>
+          <a:xfrm flipH="1">
+            <a:off x="5257800" y="1719072"/>
+            <a:ext cx="457200" cy="0"/>
+          </a:xfrm>
+          <a:prstGeom prst="straightConnector1">
+            <a:avLst/>
+          </a:prstGeom>
+          <a:ln>
+            <a:tailEnd type="triangle"/>
+          </a:ln>
+        </p:spPr>
+        <p:style>
+          <a:lnRef idx="1">
+            <a:schemeClr val="dk1"/>
+          </a:lnRef>
+          <a:fillRef idx="0">
+            <a:schemeClr val="dk1"/>
+          </a:fillRef>
+          <a:effectRef idx="0">
+            <a:schemeClr val="dk1"/>
+          </a:effectRef>
+          <a:fontRef idx="minor">
+            <a:schemeClr val="tx1"/>
+          </a:fontRef>
+        </p:style>
+      </p:cxnSp>
+      <p:sp>
+        <p:nvSpPr>
+          <p:cNvPr id="16" name="TextBox 15"/>
+          <p:cNvSpPr txBox="1"/>
+          <p:nvPr/>
+        </p:nvSpPr>
+        <p:spPr>
+          <a:xfrm>
+            <a:off x="3337560" y="5733288"/>
+            <a:ext cx="2850780" cy="369332"/>
+          </a:xfrm>
+          <a:prstGeom prst="rect">
+            <a:avLst/>
+          </a:prstGeom>
+          <a:noFill/>
+        </p:spPr>
+        <p:txBody>
+          <a:bodyPr wrap="none" rtlCol="0">
+            <a:spAutoFit/>
+          </a:bodyPr>
+          <a:lstStyle/>
+          <a:p>
+            <a:r>
+              <a:rPr lang="en-US" dirty="0" smtClean="0"/>
+              <a:t>Step 4: Finalize the selection</a:t>
+            </a:r>
+            <a:endParaRPr lang="en-US" dirty="0"/>
+          </a:p>
+        </p:txBody>
+      </p:sp>
+      <p:cxnSp>
+        <p:nvCxnSpPr>
+          <p:cNvPr id="20" name="Straight Arrow Connector 19"/>
+          <p:cNvCxnSpPr/>
+          <p:nvPr/>
+        </p:nvCxnSpPr>
+        <p:spPr>
+          <a:xfrm flipH="1">
+            <a:off x="3099816" y="5917954"/>
+            <a:ext cx="237744" cy="0"/>
+          </a:xfrm>
+          <a:prstGeom prst="straightConnector1">
+            <a:avLst/>
+          </a:prstGeom>
+          <a:ln>
+            <a:tailEnd type="triangle"/>
+          </a:ln>
+        </p:spPr>
+        <p:style>
+          <a:lnRef idx="1">
+            <a:schemeClr val="dk1"/>
+          </a:lnRef>
+          <a:fillRef idx="0">
+            <a:schemeClr val="dk1"/>
+          </a:fillRef>
+          <a:effectRef idx="0">
+            <a:schemeClr val="dk1"/>
+          </a:effectRef>
+          <a:fontRef idx="minor">
+            <a:schemeClr val="tx1"/>
+          </a:fontRef>
+        </p:style>
+      </p:cxnSp>
+    </p:spTree>
+    <p:extLst>
+      <p:ext uri="{BB962C8B-B14F-4D97-AF65-F5344CB8AC3E}">
+        <p14:creationId xmlns:p14="http://schemas.microsoft.com/office/powerpoint/2010/main" val="3470477863"/>
+      </p:ext>
+    </p:extLst>
+  </p:cSld>
+  <p:clrMapOvr>
+    <a:masterClrMapping/>
+  </p:clrMapOvr>
+  <p:timing>
+    <p:tnLst>
+      <p:par>
+        <p:cTn id="1" dur="indefinite" restart="never" nodeType="tmRoot"/>
+      </p:par>
+    </p:tnLst>
+  </p:timing>
+</p:sld>
+</file>
+
+<file path=ppt/slides/slide3.xml><?xml version="1.0" encoding="utf-8"?>
+<p:sld xmlns:a="http://schemas.openxmlformats.org/drawingml/2006/main" xmlns:r="http://schemas.openxmlformats.org/officeDocument/2006/relationships" xmlns:p="http://schemas.openxmlformats.org/presentationml/2006/main">
+  <p:cSld>
+    <p:spTree>
+      <p:nvGrpSpPr>
+        <p:cNvPr id="1" name=""/>
+        <p:cNvGrpSpPr/>
+        <p:nvPr/>
+      </p:nvGrpSpPr>
+      <p:grpSpPr>
+        <a:xfrm>
+          <a:off x="0" y="0"/>
+          <a:ext cx="0" cy="0"/>
+          <a:chOff x="0" y="0"/>
+          <a:chExt cx="0" cy="0"/>
+        </a:xfrm>
+      </p:grpSpPr>
+      <p:sp>
+        <p:nvSpPr>
+          <p:cNvPr id="2" name="Title 1"/>
+          <p:cNvSpPr>
+            <a:spLocks noGrp="1"/>
+          </p:cNvSpPr>
+          <p:nvPr>
+            <p:ph type="title"/>
+          </p:nvPr>
+        </p:nvSpPr>
+        <p:spPr>
+          <a:xfrm>
+            <a:off x="865632" y="2522890"/>
+            <a:ext cx="10515600" cy="905377"/>
+          </a:xfrm>
+        </p:spPr>
+        <p:txBody>
+          <a:bodyPr/>
+          <a:lstStyle/>
+          <a:p>
+            <a:pPr algn="ctr"/>
+            <a:r>
+              <a:rPr lang="en-US" dirty="0" smtClean="0"/>
+              <a:t>Step II : Extract Data</a:t>
+            </a:r>
+            <a:endParaRPr lang="en-US" dirty="0"/>
+          </a:p>
+        </p:txBody>
+      </p:sp>
+    </p:spTree>
+    <p:extLst>
+      <p:ext uri="{BB962C8B-B14F-4D97-AF65-F5344CB8AC3E}">
+        <p14:creationId xmlns:p14="http://schemas.microsoft.com/office/powerpoint/2010/main" val="2819824314"/>
+      </p:ext>
+    </p:extLst>
+  </p:cSld>
+  <p:clrMapOvr>
+    <a:masterClrMapping/>
+  </p:clrMapOvr>
+  <p:timing>
+    <p:tnLst>
+      <p:par>
+        <p:cTn id="1" dur="indefinite" restart="never" nodeType="tmRoot"/>
+      </p:par>
+    </p:tnLst>
+  </p:timing>
+</p:sld>
+</file>
+
+<file path=ppt/slides/slide4.xml><?xml version="1.0" encoding="utf-8"?>
+<p:sld xmlns:a="http://schemas.openxmlformats.org/drawingml/2006/main" xmlns:r="http://schemas.openxmlformats.org/officeDocument/2006/relationships" xmlns:p="http://schemas.openxmlformats.org/presentationml/2006/main">
+  <p:cSld>
+    <p:spTree>
+      <p:nvGrpSpPr>
+        <p:cNvPr id="1" name=""/>
+        <p:cNvGrpSpPr/>
+        <p:nvPr/>
+      </p:nvGrpSpPr>
+      <p:grpSpPr>
+        <a:xfrm>
+          <a:off x="0" y="0"/>
+          <a:ext cx="0" cy="0"/>
+          <a:chOff x="0" y="0"/>
+          <a:chExt cx="0" cy="0"/>
+        </a:xfrm>
+      </p:grpSpPr>
+      <p:pic>
+        <p:nvPicPr>
+          <p:cNvPr id="4" name="Picture 3"/>
+          <p:cNvPicPr>
+            <a:picLocks noChangeAspect="1"/>
+          </p:cNvPicPr>
+          <p:nvPr/>
+        </p:nvPicPr>
+        <p:blipFill>
+          <a:blip r:embed="rId2">
+            <a:extLst>
+              <a:ext uri="{28A0092B-C50C-407E-A947-70E740481C1C}">
+                <a14:useLocalDpi xmlns:a14="http://schemas.microsoft.com/office/drawing/2010/main" val="0"/>
+              </a:ext>
+            </a:extLst>
+          </a:blip>
+          <a:stretch>
+            <a:fillRect/>
+          </a:stretch>
+        </p:blipFill>
+        <p:spPr>
+          <a:xfrm>
             <a:off x="1385382" y="0"/>
             <a:ext cx="8726292" cy="6858000"/>
           </a:xfrm>
@@ -3550,6 +5295,615 @@
     <p:extLst>
       <p:ext uri="{BB962C8B-B14F-4D97-AF65-F5344CB8AC3E}">
         <p14:creationId xmlns:p14="http://schemas.microsoft.com/office/powerpoint/2010/main" val="2052474774"/>
+      </p:ext>
+    </p:extLst>
+  </p:cSld>
+  <p:clrMapOvr>
+    <a:masterClrMapping/>
+  </p:clrMapOvr>
+  <p:timing>
+    <p:tnLst>
+      <p:par>
+        <p:cTn id="1" dur="indefinite" restart="never" nodeType="tmRoot"/>
+      </p:par>
+    </p:tnLst>
+  </p:timing>
+</p:sld>
+</file>
+
+<file path=ppt/slides/slide5.xml><?xml version="1.0" encoding="utf-8"?>
+<p:sld xmlns:a="http://schemas.openxmlformats.org/drawingml/2006/main" xmlns:r="http://schemas.openxmlformats.org/officeDocument/2006/relationships" xmlns:p="http://schemas.openxmlformats.org/presentationml/2006/main">
+  <p:cSld>
+    <p:spTree>
+      <p:nvGrpSpPr>
+        <p:cNvPr id="1" name=""/>
+        <p:cNvGrpSpPr/>
+        <p:nvPr/>
+      </p:nvGrpSpPr>
+      <p:grpSpPr>
+        <a:xfrm>
+          <a:off x="0" y="0"/>
+          <a:ext cx="0" cy="0"/>
+          <a:chOff x="0" y="0"/>
+          <a:chExt cx="0" cy="0"/>
+        </a:xfrm>
+      </p:grpSpPr>
+      <p:sp>
+        <p:nvSpPr>
+          <p:cNvPr id="2" name="Title 1"/>
+          <p:cNvSpPr>
+            <a:spLocks noGrp="1"/>
+          </p:cNvSpPr>
+          <p:nvPr>
+            <p:ph type="title"/>
+          </p:nvPr>
+        </p:nvSpPr>
+        <p:spPr>
+          <a:xfrm>
+            <a:off x="938784" y="2303653"/>
+            <a:ext cx="10515600" cy="1325563"/>
+          </a:xfrm>
+        </p:spPr>
+        <p:txBody>
+          <a:bodyPr/>
+          <a:lstStyle/>
+          <a:p>
+            <a:pPr algn="ctr"/>
+            <a:r>
+              <a:rPr lang="en-US" dirty="0" smtClean="0"/>
+              <a:t>Step III : Feature Selection</a:t>
+            </a:r>
+            <a:endParaRPr lang="en-US" dirty="0"/>
+          </a:p>
+        </p:txBody>
+      </p:sp>
+    </p:spTree>
+    <p:extLst>
+      <p:ext uri="{BB962C8B-B14F-4D97-AF65-F5344CB8AC3E}">
+        <p14:creationId xmlns:p14="http://schemas.microsoft.com/office/powerpoint/2010/main" val="4004926712"/>
+      </p:ext>
+    </p:extLst>
+  </p:cSld>
+  <p:clrMapOvr>
+    <a:masterClrMapping/>
+  </p:clrMapOvr>
+  <p:timing>
+    <p:tnLst>
+      <p:par>
+        <p:cTn id="1" dur="indefinite" restart="never" nodeType="tmRoot"/>
+      </p:par>
+    </p:tnLst>
+  </p:timing>
+</p:sld>
+</file>
+
+<file path=ppt/slides/slide6.xml><?xml version="1.0" encoding="utf-8"?>
+<p:sld xmlns:a="http://schemas.openxmlformats.org/drawingml/2006/main" xmlns:r="http://schemas.openxmlformats.org/officeDocument/2006/relationships" xmlns:p="http://schemas.openxmlformats.org/presentationml/2006/main">
+  <p:cSld>
+    <p:spTree>
+      <p:nvGrpSpPr>
+        <p:cNvPr id="1" name=""/>
+        <p:cNvGrpSpPr/>
+        <p:nvPr/>
+      </p:nvGrpSpPr>
+      <p:grpSpPr>
+        <a:xfrm>
+          <a:off x="0" y="0"/>
+          <a:ext cx="0" cy="0"/>
+          <a:chOff x="0" y="0"/>
+          <a:chExt cx="0" cy="0"/>
+        </a:xfrm>
+      </p:grpSpPr>
+      <p:pic>
+        <p:nvPicPr>
+          <p:cNvPr id="4" name="Picture 3"/>
+          <p:cNvPicPr>
+            <a:picLocks noChangeAspect="1"/>
+          </p:cNvPicPr>
+          <p:nvPr/>
+        </p:nvPicPr>
+        <p:blipFill>
+          <a:blip r:embed="rId2"/>
+          <a:stretch>
+            <a:fillRect/>
+          </a:stretch>
+        </p:blipFill>
+        <p:spPr>
+          <a:xfrm>
+            <a:off x="0" y="589911"/>
+            <a:ext cx="9290304" cy="4930872"/>
+          </a:xfrm>
+          <a:prstGeom prst="rect">
+            <a:avLst/>
+          </a:prstGeom>
+        </p:spPr>
+      </p:pic>
+      <p:sp>
+        <p:nvSpPr>
+          <p:cNvPr id="5" name="Right Brace 4"/>
+          <p:cNvSpPr/>
+          <p:nvPr/>
+        </p:nvSpPr>
+        <p:spPr>
+          <a:xfrm>
+            <a:off x="9546336" y="1026475"/>
+            <a:ext cx="45719" cy="4935413"/>
+          </a:xfrm>
+          <a:prstGeom prst="rightBrace">
+            <a:avLst>
+              <a:gd name="adj1" fmla="val 188978"/>
+              <a:gd name="adj2" fmla="val 50000"/>
+            </a:avLst>
+          </a:prstGeom>
+        </p:spPr>
+        <p:style>
+          <a:lnRef idx="3">
+            <a:schemeClr val="dk1"/>
+          </a:lnRef>
+          <a:fillRef idx="0">
+            <a:schemeClr val="dk1"/>
+          </a:fillRef>
+          <a:effectRef idx="2">
+            <a:schemeClr val="dk1"/>
+          </a:effectRef>
+          <a:fontRef idx="minor">
+            <a:schemeClr val="tx1"/>
+          </a:fontRef>
+        </p:style>
+        <p:txBody>
+          <a:bodyPr rtlCol="0" anchor="ctr"/>
+          <a:lstStyle/>
+          <a:p>
+            <a:pPr algn="ctr"/>
+            <a:endParaRPr lang="en-US"/>
+          </a:p>
+        </p:txBody>
+      </p:sp>
+      <p:sp>
+        <p:nvSpPr>
+          <p:cNvPr id="6" name="TextBox 5"/>
+          <p:cNvSpPr txBox="1"/>
+          <p:nvPr/>
+        </p:nvSpPr>
+        <p:spPr>
+          <a:xfrm>
+            <a:off x="9744855" y="2889504"/>
+            <a:ext cx="2403287" cy="923330"/>
+          </a:xfrm>
+          <a:prstGeom prst="rect">
+            <a:avLst/>
+          </a:prstGeom>
+          <a:noFill/>
+        </p:spPr>
+        <p:txBody>
+          <a:bodyPr wrap="none" rtlCol="0">
+            <a:spAutoFit/>
+          </a:bodyPr>
+          <a:lstStyle/>
+          <a:p>
+            <a:r>
+              <a:rPr lang="en-US" dirty="0" smtClean="0"/>
+              <a:t>Select/Unselect the</a:t>
+            </a:r>
+          </a:p>
+          <a:p>
+            <a:r>
+              <a:rPr lang="en-US" dirty="0"/>
+              <a:t>r</a:t>
+            </a:r>
+            <a:r>
+              <a:rPr lang="en-US" dirty="0" smtClean="0"/>
+              <a:t>equired features to be </a:t>
+            </a:r>
+          </a:p>
+          <a:p>
+            <a:r>
+              <a:rPr lang="en-US" dirty="0" smtClean="0"/>
+              <a:t>considered.</a:t>
+            </a:r>
+            <a:endParaRPr lang="en-US" dirty="0"/>
+          </a:p>
+        </p:txBody>
+      </p:sp>
+    </p:spTree>
+    <p:extLst>
+      <p:ext uri="{BB962C8B-B14F-4D97-AF65-F5344CB8AC3E}">
+        <p14:creationId xmlns:p14="http://schemas.microsoft.com/office/powerpoint/2010/main" val="3564387228"/>
+      </p:ext>
+    </p:extLst>
+  </p:cSld>
+  <p:clrMapOvr>
+    <a:masterClrMapping/>
+  </p:clrMapOvr>
+</p:sld>
+</file>
+
+<file path=ppt/slides/slide7.xml><?xml version="1.0" encoding="utf-8"?>
+<p:sld xmlns:a="http://schemas.openxmlformats.org/drawingml/2006/main" xmlns:r="http://schemas.openxmlformats.org/officeDocument/2006/relationships" xmlns:p="http://schemas.openxmlformats.org/presentationml/2006/main">
+  <p:cSld>
+    <p:spTree>
+      <p:nvGrpSpPr>
+        <p:cNvPr id="1" name=""/>
+        <p:cNvGrpSpPr/>
+        <p:nvPr/>
+      </p:nvGrpSpPr>
+      <p:grpSpPr>
+        <a:xfrm>
+          <a:off x="0" y="0"/>
+          <a:ext cx="0" cy="0"/>
+          <a:chOff x="0" y="0"/>
+          <a:chExt cx="0" cy="0"/>
+        </a:xfrm>
+      </p:grpSpPr>
+      <p:pic>
+        <p:nvPicPr>
+          <p:cNvPr id="4" name="Picture 3"/>
+          <p:cNvPicPr>
+            <a:picLocks noChangeAspect="1"/>
+          </p:cNvPicPr>
+          <p:nvPr/>
+        </p:nvPicPr>
+        <p:blipFill>
+          <a:blip r:embed="rId2"/>
+          <a:stretch>
+            <a:fillRect/>
+          </a:stretch>
+        </p:blipFill>
+        <p:spPr>
+          <a:xfrm>
+            <a:off x="301752" y="329022"/>
+            <a:ext cx="6633971" cy="6252371"/>
+          </a:xfrm>
+          <a:prstGeom prst="rect">
+            <a:avLst/>
+          </a:prstGeom>
+        </p:spPr>
+      </p:pic>
+      <p:sp>
+        <p:nvSpPr>
+          <p:cNvPr id="6" name="Right Brace 5"/>
+          <p:cNvSpPr/>
+          <p:nvPr/>
+        </p:nvSpPr>
+        <p:spPr>
+          <a:xfrm>
+            <a:off x="6848856" y="1847088"/>
+            <a:ext cx="530352" cy="4645152"/>
+          </a:xfrm>
+          <a:prstGeom prst="rightBrace">
+            <a:avLst/>
+          </a:prstGeom>
+        </p:spPr>
+        <p:style>
+          <a:lnRef idx="3">
+            <a:schemeClr val="dk1"/>
+          </a:lnRef>
+          <a:fillRef idx="0">
+            <a:schemeClr val="dk1"/>
+          </a:fillRef>
+          <a:effectRef idx="2">
+            <a:schemeClr val="dk1"/>
+          </a:effectRef>
+          <a:fontRef idx="minor">
+            <a:schemeClr val="tx1"/>
+          </a:fontRef>
+        </p:style>
+        <p:txBody>
+          <a:bodyPr rtlCol="0" anchor="ctr"/>
+          <a:lstStyle/>
+          <a:p>
+            <a:pPr algn="ctr"/>
+            <a:endParaRPr lang="en-US"/>
+          </a:p>
+        </p:txBody>
+      </p:sp>
+      <p:sp>
+        <p:nvSpPr>
+          <p:cNvPr id="7" name="TextBox 6"/>
+          <p:cNvSpPr txBox="1"/>
+          <p:nvPr/>
+        </p:nvSpPr>
+        <p:spPr>
+          <a:xfrm>
+            <a:off x="7516368" y="3455207"/>
+            <a:ext cx="4199739" cy="1477328"/>
+          </a:xfrm>
+          <a:prstGeom prst="rect">
+            <a:avLst/>
+          </a:prstGeom>
+          <a:noFill/>
+        </p:spPr>
+        <p:txBody>
+          <a:bodyPr wrap="none" rtlCol="0">
+            <a:spAutoFit/>
+          </a:bodyPr>
+          <a:lstStyle/>
+          <a:p>
+            <a:r>
+              <a:rPr lang="en-US" dirty="0" smtClean="0"/>
+              <a:t>Select one features from each cluster. </a:t>
+            </a:r>
+          </a:p>
+          <a:p>
+            <a:r>
+              <a:rPr lang="en-US" dirty="0" smtClean="0"/>
+              <a:t>Clusters are formed based on correlation.</a:t>
+            </a:r>
+          </a:p>
+          <a:p>
+            <a:r>
+              <a:rPr lang="en-US" dirty="0" smtClean="0"/>
+              <a:t>If this not selected, the feature selection</a:t>
+            </a:r>
+          </a:p>
+          <a:p>
+            <a:r>
+              <a:rPr lang="en-US" dirty="0"/>
+              <a:t>a</a:t>
+            </a:r>
+            <a:r>
+              <a:rPr lang="en-US" dirty="0" smtClean="0"/>
+              <a:t>lgorithm selects one randomly from each </a:t>
+            </a:r>
+          </a:p>
+          <a:p>
+            <a:r>
+              <a:rPr lang="en-US" dirty="0" smtClean="0"/>
+              <a:t>cluster</a:t>
+            </a:r>
+            <a:endParaRPr lang="en-US" dirty="0"/>
+          </a:p>
+        </p:txBody>
+      </p:sp>
+    </p:spTree>
+    <p:extLst>
+      <p:ext uri="{BB962C8B-B14F-4D97-AF65-F5344CB8AC3E}">
+        <p14:creationId xmlns:p14="http://schemas.microsoft.com/office/powerpoint/2010/main" val="1459078880"/>
+      </p:ext>
+    </p:extLst>
+  </p:cSld>
+  <p:clrMapOvr>
+    <a:masterClrMapping/>
+  </p:clrMapOvr>
+</p:sld>
+</file>
+
+<file path=ppt/slides/slide8.xml><?xml version="1.0" encoding="utf-8"?>
+<p:sld xmlns:a="http://schemas.openxmlformats.org/drawingml/2006/main" xmlns:r="http://schemas.openxmlformats.org/officeDocument/2006/relationships" xmlns:p="http://schemas.openxmlformats.org/presentationml/2006/main">
+  <p:cSld>
+    <p:spTree>
+      <p:nvGrpSpPr>
+        <p:cNvPr id="1" name=""/>
+        <p:cNvGrpSpPr/>
+        <p:nvPr/>
+      </p:nvGrpSpPr>
+      <p:grpSpPr>
+        <a:xfrm>
+          <a:off x="0" y="0"/>
+          <a:ext cx="0" cy="0"/>
+          <a:chOff x="0" y="0"/>
+          <a:chExt cx="0" cy="0"/>
+        </a:xfrm>
+      </p:grpSpPr>
+      <p:pic>
+        <p:nvPicPr>
+          <p:cNvPr id="4" name="Picture 3"/>
+          <p:cNvPicPr>
+            <a:picLocks noChangeAspect="1"/>
+          </p:cNvPicPr>
+          <p:nvPr/>
+        </p:nvPicPr>
+        <p:blipFill>
+          <a:blip r:embed="rId2"/>
+          <a:stretch>
+            <a:fillRect/>
+          </a:stretch>
+        </p:blipFill>
+        <p:spPr>
+          <a:xfrm>
+            <a:off x="161623" y="270588"/>
+            <a:ext cx="10778130" cy="6127102"/>
+          </a:xfrm>
+          <a:prstGeom prst="rect">
+            <a:avLst/>
+          </a:prstGeom>
+        </p:spPr>
+      </p:pic>
+      <p:cxnSp>
+        <p:nvCxnSpPr>
+          <p:cNvPr id="6" name="Straight Arrow Connector 5"/>
+          <p:cNvCxnSpPr/>
+          <p:nvPr/>
+        </p:nvCxnSpPr>
+        <p:spPr>
+          <a:xfrm>
+            <a:off x="1716832" y="3163077"/>
+            <a:ext cx="513184" cy="0"/>
+          </a:xfrm>
+          <a:prstGeom prst="straightConnector1">
+            <a:avLst/>
+          </a:prstGeom>
+          <a:ln>
+            <a:tailEnd type="triangle"/>
+          </a:ln>
+        </p:spPr>
+        <p:style>
+          <a:lnRef idx="3">
+            <a:schemeClr val="dk1"/>
+          </a:lnRef>
+          <a:fillRef idx="0">
+            <a:schemeClr val="dk1"/>
+          </a:fillRef>
+          <a:effectRef idx="2">
+            <a:schemeClr val="dk1"/>
+          </a:effectRef>
+          <a:fontRef idx="minor">
+            <a:schemeClr val="tx1"/>
+          </a:fontRef>
+        </p:style>
+      </p:cxnSp>
+      <p:sp>
+        <p:nvSpPr>
+          <p:cNvPr id="8" name="TextBox 7"/>
+          <p:cNvSpPr txBox="1"/>
+          <p:nvPr/>
+        </p:nvSpPr>
+        <p:spPr>
+          <a:xfrm>
+            <a:off x="0" y="2701412"/>
+            <a:ext cx="2390398" cy="923330"/>
+          </a:xfrm>
+          <a:prstGeom prst="rect">
+            <a:avLst/>
+          </a:prstGeom>
+          <a:noFill/>
+        </p:spPr>
+        <p:txBody>
+          <a:bodyPr wrap="none" rtlCol="0">
+            <a:spAutoFit/>
+          </a:bodyPr>
+          <a:lstStyle/>
+          <a:p>
+            <a:r>
+              <a:rPr lang="en-US" dirty="0" smtClean="0"/>
+              <a:t>Step 1: Click to perform</a:t>
+            </a:r>
+          </a:p>
+          <a:p>
+            <a:r>
+              <a:rPr lang="en-US" dirty="0" smtClean="0"/>
+              <a:t> LASSO </a:t>
+            </a:r>
+          </a:p>
+          <a:p>
+            <a:r>
+              <a:rPr lang="en-US" dirty="0" smtClean="0"/>
+              <a:t>feature selection</a:t>
+            </a:r>
+            <a:endParaRPr lang="en-US" dirty="0"/>
+          </a:p>
+        </p:txBody>
+      </p:sp>
+      <p:sp>
+        <p:nvSpPr>
+          <p:cNvPr id="9" name="TextBox 8"/>
+          <p:cNvSpPr txBox="1"/>
+          <p:nvPr/>
+        </p:nvSpPr>
+        <p:spPr>
+          <a:xfrm>
+            <a:off x="124299" y="5869353"/>
+            <a:ext cx="11460381" cy="923330"/>
+          </a:xfrm>
+          <a:prstGeom prst="rect">
+            <a:avLst/>
+          </a:prstGeom>
+          <a:noFill/>
+        </p:spPr>
+        <p:txBody>
+          <a:bodyPr wrap="none" rtlCol="0">
+            <a:spAutoFit/>
+          </a:bodyPr>
+          <a:lstStyle/>
+          <a:p>
+            <a:r>
+              <a:rPr lang="en-US" dirty="0" smtClean="0"/>
+              <a:t>The LASSO model selects two model</a:t>
+            </a:r>
+          </a:p>
+          <a:p>
+            <a:pPr marL="285750" indent="-285750">
+              <a:buFontTx/>
+              <a:buChar char="-"/>
+            </a:pPr>
+            <a:r>
+              <a:rPr lang="en-US" dirty="0" smtClean="0"/>
+              <a:t>Best Model : the model with the lowest error</a:t>
+            </a:r>
+          </a:p>
+          <a:p>
+            <a:pPr marL="285750" indent="-285750">
+              <a:buFontTx/>
+              <a:buChar char="-"/>
+            </a:pPr>
+            <a:r>
+              <a:rPr lang="en-US" dirty="0" smtClean="0"/>
+              <a:t>Simple Model : the model within 1Std.Dev error of the best model, usually has lower number of features in the model</a:t>
+            </a:r>
+            <a:endParaRPr lang="en-US" dirty="0"/>
+          </a:p>
+        </p:txBody>
+      </p:sp>
+    </p:spTree>
+    <p:extLst>
+      <p:ext uri="{BB962C8B-B14F-4D97-AF65-F5344CB8AC3E}">
+        <p14:creationId xmlns:p14="http://schemas.microsoft.com/office/powerpoint/2010/main" val="2210052385"/>
+      </p:ext>
+    </p:extLst>
+  </p:cSld>
+  <p:clrMapOvr>
+    <a:masterClrMapping/>
+  </p:clrMapOvr>
+</p:sld>
+</file>
+
+<file path=ppt/slides/slide9.xml><?xml version="1.0" encoding="utf-8"?>
+<p:sld xmlns:a="http://schemas.openxmlformats.org/drawingml/2006/main" xmlns:r="http://schemas.openxmlformats.org/officeDocument/2006/relationships" xmlns:p="http://schemas.openxmlformats.org/presentationml/2006/main">
+  <p:cSld>
+    <p:spTree>
+      <p:nvGrpSpPr>
+        <p:cNvPr id="1" name=""/>
+        <p:cNvGrpSpPr/>
+        <p:nvPr/>
+      </p:nvGrpSpPr>
+      <p:grpSpPr>
+        <a:xfrm>
+          <a:off x="0" y="0"/>
+          <a:ext cx="0" cy="0"/>
+          <a:chOff x="0" y="0"/>
+          <a:chExt cx="0" cy="0"/>
+        </a:xfrm>
+      </p:grpSpPr>
+      <p:sp>
+        <p:nvSpPr>
+          <p:cNvPr id="2" name="Title 1"/>
+          <p:cNvSpPr>
+            <a:spLocks noGrp="1"/>
+          </p:cNvSpPr>
+          <p:nvPr>
+            <p:ph type="title"/>
+          </p:nvPr>
+        </p:nvSpPr>
+        <p:spPr>
+          <a:xfrm>
+            <a:off x="682752" y="2367661"/>
+            <a:ext cx="10515600" cy="1325563"/>
+          </a:xfrm>
+        </p:spPr>
+        <p:txBody>
+          <a:bodyPr/>
+          <a:lstStyle/>
+          <a:p>
+            <a:pPr algn="ctr"/>
+            <a:r>
+              <a:rPr lang="en-US" dirty="0" smtClean="0"/>
+              <a:t>Step IV : Building Models &amp; </a:t>
+            </a:r>
+            <a:br>
+              <a:rPr lang="en-US" dirty="0" smtClean="0"/>
+            </a:br>
+            <a:r>
+              <a:rPr lang="en-US" dirty="0" smtClean="0"/>
+              <a:t>Benchmark</a:t>
+            </a:r>
+            <a:endParaRPr lang="en-US" dirty="0"/>
+          </a:p>
+        </p:txBody>
+      </p:sp>
+    </p:spTree>
+    <p:extLst>
+      <p:ext uri="{BB962C8B-B14F-4D97-AF65-F5344CB8AC3E}">
+        <p14:creationId xmlns:p14="http://schemas.microsoft.com/office/powerpoint/2010/main" val="411445709"/>
       </p:ext>
     </p:extLst>
   </p:cSld>

</xml_diff>